<commit_message>
removing extra explaination from the ppt
</commit_message>
<xml_diff>
--- a/Version Control with Git.pptx
+++ b/Version Control with Git.pptx
@@ -4,6 +4,9 @@
   <p:sldMasterIdLst>
     <p:sldMasterId id="2147483780" r:id="rId1"/>
   </p:sldMasterIdLst>
+  <p:notesMasterIdLst>
+    <p:notesMasterId r:id="rId25"/>
+  </p:notesMasterIdLst>
   <p:sldIdLst>
     <p:sldId id="257" r:id="rId2"/>
     <p:sldId id="259" r:id="rId3"/>
@@ -18,7 +21,16 @@
     <p:sldId id="268" r:id="rId12"/>
     <p:sldId id="269" r:id="rId13"/>
     <p:sldId id="270" r:id="rId14"/>
-    <p:sldId id="271" r:id="rId15"/>
+    <p:sldId id="272" r:id="rId15"/>
+    <p:sldId id="273" r:id="rId16"/>
+    <p:sldId id="274" r:id="rId17"/>
+    <p:sldId id="275" r:id="rId18"/>
+    <p:sldId id="276" r:id="rId19"/>
+    <p:sldId id="277" r:id="rId20"/>
+    <p:sldId id="278" r:id="rId21"/>
+    <p:sldId id="279" r:id="rId22"/>
+    <p:sldId id="280" r:id="rId23"/>
+    <p:sldId id="271" r:id="rId24"/>
   </p:sldIdLst>
   <p:sldSz cx="12192000" cy="6858000"/>
   <p:notesSz cx="6858000" cy="9144000"/>
@@ -123,6 +135,1428 @@
     </p:ext>
   </p:extLst>
 </p:presentation>
+</file>
+
+<file path=ppt/notesMasters/notesMaster1.xml><?xml version="1.0" encoding="utf-8"?>
+<p:notesMaster xmlns:a="http://schemas.openxmlformats.org/drawingml/2006/main" xmlns:r="http://schemas.openxmlformats.org/officeDocument/2006/relationships" xmlns:p="http://schemas.openxmlformats.org/presentationml/2006/main">
+  <p:cSld>
+    <p:bg>
+      <p:bgRef idx="1001">
+        <a:schemeClr val="bg1"/>
+      </p:bgRef>
+    </p:bg>
+    <p:spTree>
+      <p:nvGrpSpPr>
+        <p:cNvPr id="1" name=""/>
+        <p:cNvGrpSpPr/>
+        <p:nvPr/>
+      </p:nvGrpSpPr>
+      <p:grpSpPr>
+        <a:xfrm>
+          <a:off x="0" y="0"/>
+          <a:ext cx="0" cy="0"/>
+          <a:chOff x="0" y="0"/>
+          <a:chExt cx="0" cy="0"/>
+        </a:xfrm>
+      </p:grpSpPr>
+      <p:sp>
+        <p:nvSpPr>
+          <p:cNvPr id="2" name="Header Placeholder 1"/>
+          <p:cNvSpPr>
+            <a:spLocks noGrp="1"/>
+          </p:cNvSpPr>
+          <p:nvPr>
+            <p:ph type="hdr" sz="quarter"/>
+          </p:nvPr>
+        </p:nvSpPr>
+        <p:spPr>
+          <a:xfrm>
+            <a:off x="0" y="0"/>
+            <a:ext cx="2971800" cy="458788"/>
+          </a:xfrm>
+          <a:prstGeom prst="rect">
+            <a:avLst/>
+          </a:prstGeom>
+        </p:spPr>
+        <p:txBody>
+          <a:bodyPr vert="horz" lIns="91440" tIns="45720" rIns="91440" bIns="45720" rtlCol="0"/>
+          <a:lstStyle>
+            <a:lvl1pPr algn="l">
+              <a:defRPr sz="1200"/>
+            </a:lvl1pPr>
+          </a:lstStyle>
+          <a:p>
+            <a:endParaRPr lang="en-US"/>
+          </a:p>
+        </p:txBody>
+      </p:sp>
+      <p:sp>
+        <p:nvSpPr>
+          <p:cNvPr id="3" name="Date Placeholder 2"/>
+          <p:cNvSpPr>
+            <a:spLocks noGrp="1"/>
+          </p:cNvSpPr>
+          <p:nvPr>
+            <p:ph type="dt" idx="1"/>
+          </p:nvPr>
+        </p:nvSpPr>
+        <p:spPr>
+          <a:xfrm>
+            <a:off x="3884613" y="0"/>
+            <a:ext cx="2971800" cy="458788"/>
+          </a:xfrm>
+          <a:prstGeom prst="rect">
+            <a:avLst/>
+          </a:prstGeom>
+        </p:spPr>
+        <p:txBody>
+          <a:bodyPr vert="horz" lIns="91440" tIns="45720" rIns="91440" bIns="45720" rtlCol="0"/>
+          <a:lstStyle>
+            <a:lvl1pPr algn="r">
+              <a:defRPr sz="1200"/>
+            </a:lvl1pPr>
+          </a:lstStyle>
+          <a:p>
+            <a:fld id="{86490335-8D62-4750-8E69-7C31140DC247}" type="datetimeFigureOut">
+              <a:rPr lang="en-US" smtClean="0"/>
+              <a:t>05-Sep-22</a:t>
+            </a:fld>
+            <a:endParaRPr lang="en-US"/>
+          </a:p>
+        </p:txBody>
+      </p:sp>
+      <p:sp>
+        <p:nvSpPr>
+          <p:cNvPr id="4" name="Slide Image Placeholder 3"/>
+          <p:cNvSpPr>
+            <a:spLocks noGrp="1" noRot="1" noChangeAspect="1"/>
+          </p:cNvSpPr>
+          <p:nvPr>
+            <p:ph type="sldImg" idx="2"/>
+          </p:nvPr>
+        </p:nvSpPr>
+        <p:spPr>
+          <a:xfrm>
+            <a:off x="685800" y="1143000"/>
+            <a:ext cx="5486400" cy="3086100"/>
+          </a:xfrm>
+          <a:prstGeom prst="rect">
+            <a:avLst/>
+          </a:prstGeom>
+          <a:noFill/>
+          <a:ln w="12700">
+            <a:solidFill>
+              <a:prstClr val="black"/>
+            </a:solidFill>
+          </a:ln>
+        </p:spPr>
+        <p:txBody>
+          <a:bodyPr vert="horz" lIns="91440" tIns="45720" rIns="91440" bIns="45720" rtlCol="0" anchor="ctr"/>
+          <a:lstStyle/>
+          <a:p>
+            <a:endParaRPr lang="en-US"/>
+          </a:p>
+        </p:txBody>
+      </p:sp>
+      <p:sp>
+        <p:nvSpPr>
+          <p:cNvPr id="5" name="Notes Placeholder 4"/>
+          <p:cNvSpPr>
+            <a:spLocks noGrp="1"/>
+          </p:cNvSpPr>
+          <p:nvPr>
+            <p:ph type="body" sz="quarter" idx="3"/>
+          </p:nvPr>
+        </p:nvSpPr>
+        <p:spPr>
+          <a:xfrm>
+            <a:off x="685800" y="4400550"/>
+            <a:ext cx="5486400" cy="3600450"/>
+          </a:xfrm>
+          <a:prstGeom prst="rect">
+            <a:avLst/>
+          </a:prstGeom>
+        </p:spPr>
+        <p:txBody>
+          <a:bodyPr vert="horz" lIns="91440" tIns="45720" rIns="91440" bIns="45720" rtlCol="0"/>
+          <a:lstStyle/>
+          <a:p>
+            <a:pPr lvl="0"/>
+            <a:r>
+              <a:rPr lang="en-US"/>
+              <a:t>Click to edit Master text styles</a:t>
+            </a:r>
+          </a:p>
+          <a:p>
+            <a:pPr lvl="1"/>
+            <a:r>
+              <a:rPr lang="en-US"/>
+              <a:t>Second level</a:t>
+            </a:r>
+          </a:p>
+          <a:p>
+            <a:pPr lvl="2"/>
+            <a:r>
+              <a:rPr lang="en-US"/>
+              <a:t>Third level</a:t>
+            </a:r>
+          </a:p>
+          <a:p>
+            <a:pPr lvl="3"/>
+            <a:r>
+              <a:rPr lang="en-US"/>
+              <a:t>Fourth level</a:t>
+            </a:r>
+          </a:p>
+          <a:p>
+            <a:pPr lvl="4"/>
+            <a:r>
+              <a:rPr lang="en-US"/>
+              <a:t>Fifth level</a:t>
+            </a:r>
+          </a:p>
+        </p:txBody>
+      </p:sp>
+      <p:sp>
+        <p:nvSpPr>
+          <p:cNvPr id="6" name="Footer Placeholder 5"/>
+          <p:cNvSpPr>
+            <a:spLocks noGrp="1"/>
+          </p:cNvSpPr>
+          <p:nvPr>
+            <p:ph type="ftr" sz="quarter" idx="4"/>
+          </p:nvPr>
+        </p:nvSpPr>
+        <p:spPr>
+          <a:xfrm>
+            <a:off x="0" y="8685213"/>
+            <a:ext cx="2971800" cy="458787"/>
+          </a:xfrm>
+          <a:prstGeom prst="rect">
+            <a:avLst/>
+          </a:prstGeom>
+        </p:spPr>
+        <p:txBody>
+          <a:bodyPr vert="horz" lIns="91440" tIns="45720" rIns="91440" bIns="45720" rtlCol="0" anchor="b"/>
+          <a:lstStyle>
+            <a:lvl1pPr algn="l">
+              <a:defRPr sz="1200"/>
+            </a:lvl1pPr>
+          </a:lstStyle>
+          <a:p>
+            <a:endParaRPr lang="en-US"/>
+          </a:p>
+        </p:txBody>
+      </p:sp>
+      <p:sp>
+        <p:nvSpPr>
+          <p:cNvPr id="7" name="Slide Number Placeholder 6"/>
+          <p:cNvSpPr>
+            <a:spLocks noGrp="1"/>
+          </p:cNvSpPr>
+          <p:nvPr>
+            <p:ph type="sldNum" sz="quarter" idx="5"/>
+          </p:nvPr>
+        </p:nvSpPr>
+        <p:spPr>
+          <a:xfrm>
+            <a:off x="3884613" y="8685213"/>
+            <a:ext cx="2971800" cy="458787"/>
+          </a:xfrm>
+          <a:prstGeom prst="rect">
+            <a:avLst/>
+          </a:prstGeom>
+        </p:spPr>
+        <p:txBody>
+          <a:bodyPr vert="horz" lIns="91440" tIns="45720" rIns="91440" bIns="45720" rtlCol="0" anchor="b"/>
+          <a:lstStyle>
+            <a:lvl1pPr algn="r">
+              <a:defRPr sz="1200"/>
+            </a:lvl1pPr>
+          </a:lstStyle>
+          <a:p>
+            <a:fld id="{D06B24EB-7A14-4F78-A6F1-CA4D94E0AE11}" type="slidenum">
+              <a:rPr lang="en-US" smtClean="0"/>
+              <a:t>‹#›</a:t>
+            </a:fld>
+            <a:endParaRPr lang="en-US"/>
+          </a:p>
+        </p:txBody>
+      </p:sp>
+    </p:spTree>
+    <p:extLst>
+      <p:ext uri="{BB962C8B-B14F-4D97-AF65-F5344CB8AC3E}">
+        <p14:creationId xmlns:p14="http://schemas.microsoft.com/office/powerpoint/2010/main" val="3311260550"/>
+      </p:ext>
+    </p:extLst>
+  </p:cSld>
+  <p:clrMap bg1="lt1" tx1="dk1" bg2="lt2" tx2="dk2" accent1="accent1" accent2="accent2" accent3="accent3" accent4="accent4" accent5="accent5" accent6="accent6" hlink="hlink" folHlink="folHlink"/>
+  <p:notesStyle>
+    <a:lvl1pPr marL="0" algn="l" defTabSz="914400" rtl="0" eaLnBrk="1" latinLnBrk="0" hangingPunct="1">
+      <a:defRPr sz="1200" kern="1200">
+        <a:solidFill>
+          <a:schemeClr val="tx1"/>
+        </a:solidFill>
+        <a:latin typeface="+mn-lt"/>
+        <a:ea typeface="+mn-ea"/>
+        <a:cs typeface="+mn-cs"/>
+      </a:defRPr>
+    </a:lvl1pPr>
+    <a:lvl2pPr marL="457200" algn="l" defTabSz="914400" rtl="0" eaLnBrk="1" latinLnBrk="0" hangingPunct="1">
+      <a:defRPr sz="1200" kern="1200">
+        <a:solidFill>
+          <a:schemeClr val="tx1"/>
+        </a:solidFill>
+        <a:latin typeface="+mn-lt"/>
+        <a:ea typeface="+mn-ea"/>
+        <a:cs typeface="+mn-cs"/>
+      </a:defRPr>
+    </a:lvl2pPr>
+    <a:lvl3pPr marL="914400" algn="l" defTabSz="914400" rtl="0" eaLnBrk="1" latinLnBrk="0" hangingPunct="1">
+      <a:defRPr sz="1200" kern="1200">
+        <a:solidFill>
+          <a:schemeClr val="tx1"/>
+        </a:solidFill>
+        <a:latin typeface="+mn-lt"/>
+        <a:ea typeface="+mn-ea"/>
+        <a:cs typeface="+mn-cs"/>
+      </a:defRPr>
+    </a:lvl3pPr>
+    <a:lvl4pPr marL="1371600" algn="l" defTabSz="914400" rtl="0" eaLnBrk="1" latinLnBrk="0" hangingPunct="1">
+      <a:defRPr sz="1200" kern="1200">
+        <a:solidFill>
+          <a:schemeClr val="tx1"/>
+        </a:solidFill>
+        <a:latin typeface="+mn-lt"/>
+        <a:ea typeface="+mn-ea"/>
+        <a:cs typeface="+mn-cs"/>
+      </a:defRPr>
+    </a:lvl4pPr>
+    <a:lvl5pPr marL="1828800" algn="l" defTabSz="914400" rtl="0" eaLnBrk="1" latinLnBrk="0" hangingPunct="1">
+      <a:defRPr sz="1200" kern="1200">
+        <a:solidFill>
+          <a:schemeClr val="tx1"/>
+        </a:solidFill>
+        <a:latin typeface="+mn-lt"/>
+        <a:ea typeface="+mn-ea"/>
+        <a:cs typeface="+mn-cs"/>
+      </a:defRPr>
+    </a:lvl5pPr>
+    <a:lvl6pPr marL="2286000" algn="l" defTabSz="914400" rtl="0" eaLnBrk="1" latinLnBrk="0" hangingPunct="1">
+      <a:defRPr sz="1200" kern="1200">
+        <a:solidFill>
+          <a:schemeClr val="tx1"/>
+        </a:solidFill>
+        <a:latin typeface="+mn-lt"/>
+        <a:ea typeface="+mn-ea"/>
+        <a:cs typeface="+mn-cs"/>
+      </a:defRPr>
+    </a:lvl6pPr>
+    <a:lvl7pPr marL="2743200" algn="l" defTabSz="914400" rtl="0" eaLnBrk="1" latinLnBrk="0" hangingPunct="1">
+      <a:defRPr sz="1200" kern="1200">
+        <a:solidFill>
+          <a:schemeClr val="tx1"/>
+        </a:solidFill>
+        <a:latin typeface="+mn-lt"/>
+        <a:ea typeface="+mn-ea"/>
+        <a:cs typeface="+mn-cs"/>
+      </a:defRPr>
+    </a:lvl7pPr>
+    <a:lvl8pPr marL="3200400" algn="l" defTabSz="914400" rtl="0" eaLnBrk="1" latinLnBrk="0" hangingPunct="1">
+      <a:defRPr sz="1200" kern="1200">
+        <a:solidFill>
+          <a:schemeClr val="tx1"/>
+        </a:solidFill>
+        <a:latin typeface="+mn-lt"/>
+        <a:ea typeface="+mn-ea"/>
+        <a:cs typeface="+mn-cs"/>
+      </a:defRPr>
+    </a:lvl8pPr>
+    <a:lvl9pPr marL="3657600" algn="l" defTabSz="914400" rtl="0" eaLnBrk="1" latinLnBrk="0" hangingPunct="1">
+      <a:defRPr sz="1200" kern="1200">
+        <a:solidFill>
+          <a:schemeClr val="tx1"/>
+        </a:solidFill>
+        <a:latin typeface="+mn-lt"/>
+        <a:ea typeface="+mn-ea"/>
+        <a:cs typeface="+mn-cs"/>
+      </a:defRPr>
+    </a:lvl9pPr>
+  </p:notesStyle>
+</p:notesMaster>
+</file>
+
+<file path=ppt/notesSlides/notesSlide1.xml><?xml version="1.0" encoding="utf-8"?>
+<p:notes xmlns:a="http://schemas.openxmlformats.org/drawingml/2006/main" xmlns:r="http://schemas.openxmlformats.org/officeDocument/2006/relationships" xmlns:p="http://schemas.openxmlformats.org/presentationml/2006/main">
+  <p:cSld>
+    <p:spTree>
+      <p:nvGrpSpPr>
+        <p:cNvPr id="1" name=""/>
+        <p:cNvGrpSpPr/>
+        <p:nvPr/>
+      </p:nvGrpSpPr>
+      <p:grpSpPr>
+        <a:xfrm>
+          <a:off x="0" y="0"/>
+          <a:ext cx="0" cy="0"/>
+          <a:chOff x="0" y="0"/>
+          <a:chExt cx="0" cy="0"/>
+        </a:xfrm>
+      </p:grpSpPr>
+      <p:sp>
+        <p:nvSpPr>
+          <p:cNvPr id="2" name="Slide Image Placeholder 1"/>
+          <p:cNvSpPr>
+            <a:spLocks noGrp="1" noRot="1" noChangeAspect="1"/>
+          </p:cNvSpPr>
+          <p:nvPr>
+            <p:ph type="sldImg"/>
+          </p:nvPr>
+        </p:nvSpPr>
+        <p:spPr/>
+      </p:sp>
+      <p:sp>
+        <p:nvSpPr>
+          <p:cNvPr id="3" name="Notes Placeholder 2"/>
+          <p:cNvSpPr>
+            <a:spLocks noGrp="1"/>
+          </p:cNvSpPr>
+          <p:nvPr>
+            <p:ph type="body" idx="1"/>
+          </p:nvPr>
+        </p:nvSpPr>
+        <p:spPr/>
+        <p:txBody>
+          <a:bodyPr/>
+          <a:lstStyle/>
+          <a:p>
+            <a:pPr marL="171450" indent="-171450">
+              <a:buFont typeface="Arial" panose="020B0604020202020204" pitchFamily="34" charset="0"/>
+              <a:buChar char="•"/>
+            </a:pPr>
+            <a:r>
+              <a:rPr lang="en-US" b="0" i="0" dirty="0">
+                <a:solidFill>
+                  <a:srgbClr val="4D4D4D"/>
+                </a:solidFill>
+                <a:effectLst/>
+                <a:latin typeface="-apple-system"/>
+              </a:rPr>
+              <a:t>Version control, also known as source control, is the practice of tracking and managing changes to software code. </a:t>
+            </a:r>
+          </a:p>
+          <a:p>
+            <a:pPr marL="171450" indent="-171450">
+              <a:buFont typeface="Arial" panose="020B0604020202020204" pitchFamily="34" charset="0"/>
+              <a:buChar char="•"/>
+            </a:pPr>
+            <a:r>
+              <a:rPr lang="en-US" b="0" i="0" dirty="0">
+                <a:solidFill>
+                  <a:srgbClr val="4D4D4D"/>
+                </a:solidFill>
+                <a:effectLst/>
+                <a:latin typeface="-apple-system"/>
+              </a:rPr>
+              <a:t>It is a software tools that help software teams manage changes to source code over time.</a:t>
+            </a:r>
+            <a:endParaRPr lang="en-US" dirty="0"/>
+          </a:p>
+          <a:p>
+            <a:endParaRPr lang="en-US" dirty="0"/>
+          </a:p>
+        </p:txBody>
+      </p:sp>
+      <p:sp>
+        <p:nvSpPr>
+          <p:cNvPr id="4" name="Slide Number Placeholder 3"/>
+          <p:cNvSpPr>
+            <a:spLocks noGrp="1"/>
+          </p:cNvSpPr>
+          <p:nvPr>
+            <p:ph type="sldNum" sz="quarter" idx="5"/>
+          </p:nvPr>
+        </p:nvSpPr>
+        <p:spPr/>
+        <p:txBody>
+          <a:bodyPr/>
+          <a:lstStyle/>
+          <a:p>
+            <a:fld id="{D06B24EB-7A14-4F78-A6F1-CA4D94E0AE11}" type="slidenum">
+              <a:rPr lang="en-US" smtClean="0"/>
+              <a:t>2</a:t>
+            </a:fld>
+            <a:endParaRPr lang="en-US"/>
+          </a:p>
+        </p:txBody>
+      </p:sp>
+    </p:spTree>
+    <p:extLst>
+      <p:ext uri="{BB962C8B-B14F-4D97-AF65-F5344CB8AC3E}">
+        <p14:creationId xmlns:p14="http://schemas.microsoft.com/office/powerpoint/2010/main" val="1554024009"/>
+      </p:ext>
+    </p:extLst>
+  </p:cSld>
+  <p:clrMapOvr>
+    <a:masterClrMapping/>
+  </p:clrMapOvr>
+</p:notes>
+</file>
+
+<file path=ppt/notesSlides/notesSlide2.xml><?xml version="1.0" encoding="utf-8"?>
+<p:notes xmlns:a="http://schemas.openxmlformats.org/drawingml/2006/main" xmlns:r="http://schemas.openxmlformats.org/officeDocument/2006/relationships" xmlns:p="http://schemas.openxmlformats.org/presentationml/2006/main">
+  <p:cSld>
+    <p:spTree>
+      <p:nvGrpSpPr>
+        <p:cNvPr id="1" name=""/>
+        <p:cNvGrpSpPr/>
+        <p:nvPr/>
+      </p:nvGrpSpPr>
+      <p:grpSpPr>
+        <a:xfrm>
+          <a:off x="0" y="0"/>
+          <a:ext cx="0" cy="0"/>
+          <a:chOff x="0" y="0"/>
+          <a:chExt cx="0" cy="0"/>
+        </a:xfrm>
+      </p:grpSpPr>
+      <p:sp>
+        <p:nvSpPr>
+          <p:cNvPr id="2" name="Slide Image Placeholder 1"/>
+          <p:cNvSpPr>
+            <a:spLocks noGrp="1" noRot="1" noChangeAspect="1"/>
+          </p:cNvSpPr>
+          <p:nvPr>
+            <p:ph type="sldImg"/>
+          </p:nvPr>
+        </p:nvSpPr>
+        <p:spPr/>
+      </p:sp>
+      <p:sp>
+        <p:nvSpPr>
+          <p:cNvPr id="3" name="Notes Placeholder 2"/>
+          <p:cNvSpPr>
+            <a:spLocks noGrp="1"/>
+          </p:cNvSpPr>
+          <p:nvPr>
+            <p:ph type="body" idx="1"/>
+          </p:nvPr>
+        </p:nvSpPr>
+        <p:spPr/>
+        <p:txBody>
+          <a:bodyPr/>
+          <a:lstStyle/>
+          <a:p>
+            <a:pPr marL="171450" indent="-171450">
+              <a:buFont typeface="Arial" panose="020B0604020202020204" pitchFamily="34" charset="0"/>
+              <a:buChar char="•"/>
+            </a:pPr>
+            <a:r>
+              <a:rPr lang="en-US" b="0" i="0" dirty="0">
+                <a:solidFill>
+                  <a:srgbClr val="202124"/>
+                </a:solidFill>
+                <a:effectLst/>
+                <a:latin typeface="arial" panose="020B0604020202020204" pitchFamily="34" charset="0"/>
+              </a:rPr>
+              <a:t>The git </a:t>
+            </a:r>
+            <a:r>
+              <a:rPr lang="en-US" b="0" i="0" dirty="0" err="1">
+                <a:solidFill>
+                  <a:srgbClr val="202124"/>
+                </a:solidFill>
+                <a:effectLst/>
+                <a:latin typeface="arial" panose="020B0604020202020204" pitchFamily="34" charset="0"/>
+              </a:rPr>
+              <a:t>init</a:t>
+            </a:r>
+            <a:r>
+              <a:rPr lang="en-US" b="0" i="0" dirty="0">
+                <a:solidFill>
+                  <a:srgbClr val="202124"/>
+                </a:solidFill>
+                <a:effectLst/>
+                <a:latin typeface="arial" panose="020B0604020202020204" pitchFamily="34" charset="0"/>
+              </a:rPr>
+              <a:t> command </a:t>
+            </a:r>
+            <a:r>
+              <a:rPr lang="en-US" b="1" i="0" dirty="0">
+                <a:solidFill>
+                  <a:srgbClr val="202124"/>
+                </a:solidFill>
+                <a:effectLst/>
+                <a:latin typeface="arial" panose="020B0604020202020204" pitchFamily="34" charset="0"/>
+              </a:rPr>
+              <a:t>creates a new Git repository</a:t>
+            </a:r>
+            <a:r>
+              <a:rPr lang="en-US" b="0" i="0" dirty="0">
+                <a:solidFill>
+                  <a:srgbClr val="202124"/>
+                </a:solidFill>
+                <a:effectLst/>
+                <a:latin typeface="arial" panose="020B0604020202020204" pitchFamily="34" charset="0"/>
+              </a:rPr>
+              <a:t>. It can be used to convert an existing, </a:t>
+            </a:r>
+            <a:r>
+              <a:rPr lang="en-US" b="0" i="0" dirty="0" err="1">
+                <a:solidFill>
+                  <a:srgbClr val="202124"/>
+                </a:solidFill>
+                <a:effectLst/>
+                <a:latin typeface="arial" panose="020B0604020202020204" pitchFamily="34" charset="0"/>
+              </a:rPr>
+              <a:t>unversioned</a:t>
+            </a:r>
+            <a:r>
+              <a:rPr lang="en-US" b="0" i="0" dirty="0">
+                <a:solidFill>
+                  <a:srgbClr val="202124"/>
+                </a:solidFill>
+                <a:effectLst/>
+                <a:latin typeface="arial" panose="020B0604020202020204" pitchFamily="34" charset="0"/>
+              </a:rPr>
+              <a:t> project to a Git repository or initialize a new, empty repository</a:t>
+            </a:r>
+            <a:endParaRPr lang="en-US" dirty="0"/>
+          </a:p>
+        </p:txBody>
+      </p:sp>
+      <p:sp>
+        <p:nvSpPr>
+          <p:cNvPr id="4" name="Slide Number Placeholder 3"/>
+          <p:cNvSpPr>
+            <a:spLocks noGrp="1"/>
+          </p:cNvSpPr>
+          <p:nvPr>
+            <p:ph type="sldNum" sz="quarter" idx="5"/>
+          </p:nvPr>
+        </p:nvSpPr>
+        <p:spPr/>
+        <p:txBody>
+          <a:bodyPr/>
+          <a:lstStyle/>
+          <a:p>
+            <a:fld id="{D06B24EB-7A14-4F78-A6F1-CA4D94E0AE11}" type="slidenum">
+              <a:rPr lang="en-US" smtClean="0"/>
+              <a:t>4</a:t>
+            </a:fld>
+            <a:endParaRPr lang="en-US"/>
+          </a:p>
+        </p:txBody>
+      </p:sp>
+    </p:spTree>
+    <p:extLst>
+      <p:ext uri="{BB962C8B-B14F-4D97-AF65-F5344CB8AC3E}">
+        <p14:creationId xmlns:p14="http://schemas.microsoft.com/office/powerpoint/2010/main" val="1111234208"/>
+      </p:ext>
+    </p:extLst>
+  </p:cSld>
+  <p:clrMapOvr>
+    <a:masterClrMapping/>
+  </p:clrMapOvr>
+</p:notes>
+</file>
+
+<file path=ppt/notesSlides/notesSlide3.xml><?xml version="1.0" encoding="utf-8"?>
+<p:notes xmlns:a="http://schemas.openxmlformats.org/drawingml/2006/main" xmlns:r="http://schemas.openxmlformats.org/officeDocument/2006/relationships" xmlns:p="http://schemas.openxmlformats.org/presentationml/2006/main">
+  <p:cSld>
+    <p:spTree>
+      <p:nvGrpSpPr>
+        <p:cNvPr id="1" name=""/>
+        <p:cNvGrpSpPr/>
+        <p:nvPr/>
+      </p:nvGrpSpPr>
+      <p:grpSpPr>
+        <a:xfrm>
+          <a:off x="0" y="0"/>
+          <a:ext cx="0" cy="0"/>
+          <a:chOff x="0" y="0"/>
+          <a:chExt cx="0" cy="0"/>
+        </a:xfrm>
+      </p:grpSpPr>
+      <p:sp>
+        <p:nvSpPr>
+          <p:cNvPr id="2" name="Slide Image Placeholder 1"/>
+          <p:cNvSpPr>
+            <a:spLocks noGrp="1" noRot="1" noChangeAspect="1"/>
+          </p:cNvSpPr>
+          <p:nvPr>
+            <p:ph type="sldImg"/>
+          </p:nvPr>
+        </p:nvSpPr>
+        <p:spPr/>
+      </p:sp>
+      <p:sp>
+        <p:nvSpPr>
+          <p:cNvPr id="3" name="Notes Placeholder 2"/>
+          <p:cNvSpPr>
+            <a:spLocks noGrp="1"/>
+          </p:cNvSpPr>
+          <p:nvPr>
+            <p:ph type="body" idx="1"/>
+          </p:nvPr>
+        </p:nvSpPr>
+        <p:spPr/>
+        <p:txBody>
+          <a:bodyPr/>
+          <a:lstStyle/>
+          <a:p>
+            <a:pPr marL="171450" indent="-171450">
+              <a:buFont typeface="Arial" panose="020B0604020202020204" pitchFamily="34" charset="0"/>
+              <a:buChar char="•"/>
+            </a:pPr>
+            <a:endParaRPr lang="en-US" dirty="0"/>
+          </a:p>
+          <a:p>
+            <a:pPr marL="171450" indent="-171450">
+              <a:buFont typeface="Arial" panose="020B0604020202020204" pitchFamily="34" charset="0"/>
+              <a:buChar char="•"/>
+            </a:pPr>
+            <a:endParaRPr lang="en-US" dirty="0"/>
+          </a:p>
+          <a:p>
+            <a:pPr marL="171450" indent="-171450">
+              <a:buFont typeface="Arial" panose="020B0604020202020204" pitchFamily="34" charset="0"/>
+              <a:buChar char="•"/>
+            </a:pPr>
+            <a:r>
+              <a:rPr lang="en-US" dirty="0"/>
+              <a:t>You can use git log “SHA” to see the commits after that specific SHA only. git show “SHA” as well to see the info regarding that particular commit.</a:t>
+            </a:r>
+          </a:p>
+          <a:p>
+            <a:pPr marL="171450" indent="-171450">
+              <a:buFont typeface="Arial" panose="020B0604020202020204" pitchFamily="34" charset="0"/>
+              <a:buChar char="•"/>
+            </a:pPr>
+            <a:endParaRPr lang="en-US" dirty="0"/>
+          </a:p>
+        </p:txBody>
+      </p:sp>
+      <p:sp>
+        <p:nvSpPr>
+          <p:cNvPr id="4" name="Slide Number Placeholder 3"/>
+          <p:cNvSpPr>
+            <a:spLocks noGrp="1"/>
+          </p:cNvSpPr>
+          <p:nvPr>
+            <p:ph type="sldNum" sz="quarter" idx="5"/>
+          </p:nvPr>
+        </p:nvSpPr>
+        <p:spPr/>
+        <p:txBody>
+          <a:bodyPr/>
+          <a:lstStyle/>
+          <a:p>
+            <a:fld id="{D06B24EB-7A14-4F78-A6F1-CA4D94E0AE11}" type="slidenum">
+              <a:rPr lang="en-US" smtClean="0"/>
+              <a:t>7</a:t>
+            </a:fld>
+            <a:endParaRPr lang="en-US"/>
+          </a:p>
+        </p:txBody>
+      </p:sp>
+    </p:spTree>
+    <p:extLst>
+      <p:ext uri="{BB962C8B-B14F-4D97-AF65-F5344CB8AC3E}">
+        <p14:creationId xmlns:p14="http://schemas.microsoft.com/office/powerpoint/2010/main" val="1785664963"/>
+      </p:ext>
+    </p:extLst>
+  </p:cSld>
+  <p:clrMapOvr>
+    <a:masterClrMapping/>
+  </p:clrMapOvr>
+</p:notes>
+</file>
+
+<file path=ppt/notesSlides/notesSlide4.xml><?xml version="1.0" encoding="utf-8"?>
+<p:notes xmlns:a="http://schemas.openxmlformats.org/drawingml/2006/main" xmlns:r="http://schemas.openxmlformats.org/officeDocument/2006/relationships" xmlns:p="http://schemas.openxmlformats.org/presentationml/2006/main">
+  <p:cSld>
+    <p:spTree>
+      <p:nvGrpSpPr>
+        <p:cNvPr id="1" name=""/>
+        <p:cNvGrpSpPr/>
+        <p:nvPr/>
+      </p:nvGrpSpPr>
+      <p:grpSpPr>
+        <a:xfrm>
+          <a:off x="0" y="0"/>
+          <a:ext cx="0" cy="0"/>
+          <a:chOff x="0" y="0"/>
+          <a:chExt cx="0" cy="0"/>
+        </a:xfrm>
+      </p:grpSpPr>
+      <p:sp>
+        <p:nvSpPr>
+          <p:cNvPr id="2" name="Slide Image Placeholder 1"/>
+          <p:cNvSpPr>
+            <a:spLocks noGrp="1" noRot="1" noChangeAspect="1"/>
+          </p:cNvSpPr>
+          <p:nvPr>
+            <p:ph type="sldImg"/>
+          </p:nvPr>
+        </p:nvSpPr>
+        <p:spPr/>
+      </p:sp>
+      <p:sp>
+        <p:nvSpPr>
+          <p:cNvPr id="3" name="Notes Placeholder 2"/>
+          <p:cNvSpPr>
+            <a:spLocks noGrp="1"/>
+          </p:cNvSpPr>
+          <p:nvPr>
+            <p:ph type="body" idx="1"/>
+          </p:nvPr>
+        </p:nvSpPr>
+        <p:spPr/>
+        <p:txBody>
+          <a:bodyPr/>
+          <a:lstStyle/>
+          <a:p>
+            <a:r>
+              <a:rPr lang="en-US" b="1" dirty="0"/>
+              <a:t>Add : </a:t>
+            </a:r>
+            <a:r>
+              <a:rPr lang="en-US" dirty="0"/>
+              <a:t>using git add you can add the modified files into the staged files.</a:t>
+            </a:r>
+          </a:p>
+          <a:p>
+            <a:r>
+              <a:rPr lang="en-US" b="1" dirty="0"/>
+              <a:t>Commit : </a:t>
+            </a:r>
+            <a:r>
+              <a:rPr lang="en-US" dirty="0"/>
+              <a:t>After staging the files you can commit them using </a:t>
+            </a:r>
+            <a:r>
+              <a:rPr lang="en-US" b="1" dirty="0"/>
+              <a:t>git commit –m “appropriate message foe that commit” .</a:t>
+            </a:r>
+          </a:p>
+          <a:p>
+            <a:r>
+              <a:rPr lang="en-US" b="1" dirty="0"/>
+              <a:t>diff : </a:t>
+            </a:r>
+            <a:r>
+              <a:rPr lang="en-US" dirty="0"/>
+              <a:t>you can use git diff command to see those changes who have not been committed yet.</a:t>
+            </a:r>
+            <a:r>
+              <a:rPr lang="en-US" b="1" dirty="0"/>
+              <a:t> </a:t>
+            </a:r>
+          </a:p>
+          <a:p>
+            <a:r>
+              <a:rPr lang="en-US" b="1" dirty="0"/>
+              <a:t>tag : </a:t>
+            </a:r>
+            <a:r>
+              <a:rPr lang="en-US" dirty="0"/>
+              <a:t>you can add tags to some extent of your project in-order to capture the specific point in history that is further used to point to a released version.</a:t>
+            </a:r>
+            <a:r>
+              <a:rPr lang="en-US" b="1" dirty="0"/>
+              <a:t> </a:t>
+            </a:r>
+            <a:r>
+              <a:rPr lang="en-US" dirty="0"/>
+              <a:t>Using git tag v1.0</a:t>
+            </a:r>
+          </a:p>
+          <a:p>
+            <a:endParaRPr lang="en-US" dirty="0"/>
+          </a:p>
+        </p:txBody>
+      </p:sp>
+      <p:sp>
+        <p:nvSpPr>
+          <p:cNvPr id="4" name="Slide Number Placeholder 3"/>
+          <p:cNvSpPr>
+            <a:spLocks noGrp="1"/>
+          </p:cNvSpPr>
+          <p:nvPr>
+            <p:ph type="sldNum" sz="quarter" idx="5"/>
+          </p:nvPr>
+        </p:nvSpPr>
+        <p:spPr/>
+        <p:txBody>
+          <a:bodyPr/>
+          <a:lstStyle/>
+          <a:p>
+            <a:fld id="{D06B24EB-7A14-4F78-A6F1-CA4D94E0AE11}" type="slidenum">
+              <a:rPr lang="en-US" smtClean="0"/>
+              <a:t>8</a:t>
+            </a:fld>
+            <a:endParaRPr lang="en-US"/>
+          </a:p>
+        </p:txBody>
+      </p:sp>
+    </p:spTree>
+    <p:extLst>
+      <p:ext uri="{BB962C8B-B14F-4D97-AF65-F5344CB8AC3E}">
+        <p14:creationId xmlns:p14="http://schemas.microsoft.com/office/powerpoint/2010/main" val="721823472"/>
+      </p:ext>
+    </p:extLst>
+  </p:cSld>
+  <p:clrMapOvr>
+    <a:masterClrMapping/>
+  </p:clrMapOvr>
+</p:notes>
+</file>
+
+<file path=ppt/notesSlides/notesSlide5.xml><?xml version="1.0" encoding="utf-8"?>
+<p:notes xmlns:a="http://schemas.openxmlformats.org/drawingml/2006/main" xmlns:r="http://schemas.openxmlformats.org/officeDocument/2006/relationships" xmlns:p="http://schemas.openxmlformats.org/presentationml/2006/main">
+  <p:cSld>
+    <p:spTree>
+      <p:nvGrpSpPr>
+        <p:cNvPr id="1" name=""/>
+        <p:cNvGrpSpPr/>
+        <p:nvPr/>
+      </p:nvGrpSpPr>
+      <p:grpSpPr>
+        <a:xfrm>
+          <a:off x="0" y="0"/>
+          <a:ext cx="0" cy="0"/>
+          <a:chOff x="0" y="0"/>
+          <a:chExt cx="0" cy="0"/>
+        </a:xfrm>
+      </p:grpSpPr>
+      <p:sp>
+        <p:nvSpPr>
+          <p:cNvPr id="2" name="Slide Image Placeholder 1"/>
+          <p:cNvSpPr>
+            <a:spLocks noGrp="1" noRot="1" noChangeAspect="1"/>
+          </p:cNvSpPr>
+          <p:nvPr>
+            <p:ph type="sldImg"/>
+          </p:nvPr>
+        </p:nvSpPr>
+        <p:spPr/>
+      </p:sp>
+      <p:sp>
+        <p:nvSpPr>
+          <p:cNvPr id="3" name="Notes Placeholder 2"/>
+          <p:cNvSpPr>
+            <a:spLocks noGrp="1"/>
+          </p:cNvSpPr>
+          <p:nvPr>
+            <p:ph type="body" idx="1"/>
+          </p:nvPr>
+        </p:nvSpPr>
+        <p:spPr/>
+        <p:txBody>
+          <a:bodyPr/>
+          <a:lstStyle/>
+          <a:p>
+            <a:pPr marL="171450" marR="0" lvl="0" indent="-171450" algn="l" defTabSz="914400" rtl="0" eaLnBrk="1" fontAlgn="auto" latinLnBrk="0" hangingPunct="1">
+              <a:lnSpc>
+                <a:spcPct val="100000"/>
+              </a:lnSpc>
+              <a:spcBef>
+                <a:spcPts val="0"/>
+              </a:spcBef>
+              <a:spcAft>
+                <a:spcPts val="0"/>
+              </a:spcAft>
+              <a:buClrTx/>
+              <a:buSzTx/>
+              <a:buFont typeface="Arial" panose="020B0604020202020204" pitchFamily="34" charset="0"/>
+              <a:buChar char="•"/>
+              <a:tabLst/>
+              <a:defRPr/>
+            </a:pPr>
+            <a:r>
+              <a:rPr lang="en-US" dirty="0"/>
+              <a:t>The first thing to understand about </a:t>
+            </a:r>
+            <a:r>
+              <a:rPr lang="en-US" b="1" dirty="0"/>
+              <a:t>git rebase</a:t>
+            </a:r>
+            <a:r>
+              <a:rPr lang="en-US" dirty="0"/>
+              <a:t> is that it solves the same problem as </a:t>
+            </a:r>
+            <a:r>
+              <a:rPr lang="en-US" b="1" dirty="0"/>
+              <a:t>git merge</a:t>
+            </a:r>
+            <a:r>
+              <a:rPr lang="en-US" dirty="0"/>
+              <a:t>. Both of these commands are designed to integrate changes from one branch into another branch—they just do it in very different ways.</a:t>
+            </a:r>
+          </a:p>
+          <a:p>
+            <a:pPr marL="171450" indent="-171450">
+              <a:buFont typeface="Arial" panose="020B0604020202020204" pitchFamily="34" charset="0"/>
+              <a:buChar char="•"/>
+            </a:pPr>
+            <a:endParaRPr lang="en-US" dirty="0"/>
+          </a:p>
+        </p:txBody>
+      </p:sp>
+      <p:sp>
+        <p:nvSpPr>
+          <p:cNvPr id="4" name="Slide Number Placeholder 3"/>
+          <p:cNvSpPr>
+            <a:spLocks noGrp="1"/>
+          </p:cNvSpPr>
+          <p:nvPr>
+            <p:ph type="sldNum" sz="quarter" idx="5"/>
+          </p:nvPr>
+        </p:nvSpPr>
+        <p:spPr/>
+        <p:txBody>
+          <a:bodyPr/>
+          <a:lstStyle/>
+          <a:p>
+            <a:fld id="{D06B24EB-7A14-4F78-A6F1-CA4D94E0AE11}" type="slidenum">
+              <a:rPr lang="en-US" smtClean="0"/>
+              <a:t>14</a:t>
+            </a:fld>
+            <a:endParaRPr lang="en-US"/>
+          </a:p>
+        </p:txBody>
+      </p:sp>
+    </p:spTree>
+    <p:extLst>
+      <p:ext uri="{BB962C8B-B14F-4D97-AF65-F5344CB8AC3E}">
+        <p14:creationId xmlns:p14="http://schemas.microsoft.com/office/powerpoint/2010/main" val="907322911"/>
+      </p:ext>
+    </p:extLst>
+  </p:cSld>
+  <p:clrMapOvr>
+    <a:masterClrMapping/>
+  </p:clrMapOvr>
+</p:notes>
+</file>
+
+<file path=ppt/notesSlides/notesSlide6.xml><?xml version="1.0" encoding="utf-8"?>
+<p:notes xmlns:a="http://schemas.openxmlformats.org/drawingml/2006/main" xmlns:r="http://schemas.openxmlformats.org/officeDocument/2006/relationships" xmlns:p="http://schemas.openxmlformats.org/presentationml/2006/main">
+  <p:cSld>
+    <p:spTree>
+      <p:nvGrpSpPr>
+        <p:cNvPr id="1" name=""/>
+        <p:cNvGrpSpPr/>
+        <p:nvPr/>
+      </p:nvGrpSpPr>
+      <p:grpSpPr>
+        <a:xfrm>
+          <a:off x="0" y="0"/>
+          <a:ext cx="0" cy="0"/>
+          <a:chOff x="0" y="0"/>
+          <a:chExt cx="0" cy="0"/>
+        </a:xfrm>
+      </p:grpSpPr>
+      <p:sp>
+        <p:nvSpPr>
+          <p:cNvPr id="2" name="Slide Image Placeholder 1"/>
+          <p:cNvSpPr>
+            <a:spLocks noGrp="1" noRot="1" noChangeAspect="1"/>
+          </p:cNvSpPr>
+          <p:nvPr>
+            <p:ph type="sldImg"/>
+          </p:nvPr>
+        </p:nvSpPr>
+        <p:spPr/>
+      </p:sp>
+      <p:sp>
+        <p:nvSpPr>
+          <p:cNvPr id="3" name="Notes Placeholder 2"/>
+          <p:cNvSpPr>
+            <a:spLocks noGrp="1"/>
+          </p:cNvSpPr>
+          <p:nvPr>
+            <p:ph type="body" idx="1"/>
+          </p:nvPr>
+        </p:nvSpPr>
+        <p:spPr/>
+        <p:txBody>
+          <a:bodyPr/>
+          <a:lstStyle/>
+          <a:p>
+            <a:pPr marL="171450" indent="-171450">
+              <a:buFont typeface="Arial" panose="020B0604020202020204" pitchFamily="34" charset="0"/>
+              <a:buChar char="•"/>
+            </a:pPr>
+            <a:r>
+              <a:rPr lang="en-US" dirty="0"/>
+              <a:t>This moves the entire feature branch to begin on the tip of the main branch, effectively incorporating all of the new commits in main. But, instead of using a merge commit, rebasing re-writes the project history by creating brand new commits for each commit in the original branch.</a:t>
+            </a:r>
+          </a:p>
+          <a:p>
+            <a:endParaRPr lang="en-US" dirty="0"/>
+          </a:p>
+        </p:txBody>
+      </p:sp>
+      <p:sp>
+        <p:nvSpPr>
+          <p:cNvPr id="4" name="Slide Number Placeholder 3"/>
+          <p:cNvSpPr>
+            <a:spLocks noGrp="1"/>
+          </p:cNvSpPr>
+          <p:nvPr>
+            <p:ph type="sldNum" sz="quarter" idx="5"/>
+          </p:nvPr>
+        </p:nvSpPr>
+        <p:spPr/>
+        <p:txBody>
+          <a:bodyPr/>
+          <a:lstStyle/>
+          <a:p>
+            <a:fld id="{D06B24EB-7A14-4F78-A6F1-CA4D94E0AE11}" type="slidenum">
+              <a:rPr lang="en-US" smtClean="0"/>
+              <a:t>18</a:t>
+            </a:fld>
+            <a:endParaRPr lang="en-US"/>
+          </a:p>
+        </p:txBody>
+      </p:sp>
+    </p:spTree>
+    <p:extLst>
+      <p:ext uri="{BB962C8B-B14F-4D97-AF65-F5344CB8AC3E}">
+        <p14:creationId xmlns:p14="http://schemas.microsoft.com/office/powerpoint/2010/main" val="1578382935"/>
+      </p:ext>
+    </p:extLst>
+  </p:cSld>
+  <p:clrMapOvr>
+    <a:masterClrMapping/>
+  </p:clrMapOvr>
+</p:notes>
+</file>
+
+<file path=ppt/notesSlides/notesSlide7.xml><?xml version="1.0" encoding="utf-8"?>
+<p:notes xmlns:a="http://schemas.openxmlformats.org/drawingml/2006/main" xmlns:r="http://schemas.openxmlformats.org/officeDocument/2006/relationships" xmlns:p="http://schemas.openxmlformats.org/presentationml/2006/main">
+  <p:cSld>
+    <p:spTree>
+      <p:nvGrpSpPr>
+        <p:cNvPr id="1" name=""/>
+        <p:cNvGrpSpPr/>
+        <p:nvPr/>
+      </p:nvGrpSpPr>
+      <p:grpSpPr>
+        <a:xfrm>
+          <a:off x="0" y="0"/>
+          <a:ext cx="0" cy="0"/>
+          <a:chOff x="0" y="0"/>
+          <a:chExt cx="0" cy="0"/>
+        </a:xfrm>
+      </p:grpSpPr>
+      <p:sp>
+        <p:nvSpPr>
+          <p:cNvPr id="2" name="Slide Image Placeholder 1"/>
+          <p:cNvSpPr>
+            <a:spLocks noGrp="1" noRot="1" noChangeAspect="1"/>
+          </p:cNvSpPr>
+          <p:nvPr>
+            <p:ph type="sldImg"/>
+          </p:nvPr>
+        </p:nvSpPr>
+        <p:spPr/>
+      </p:sp>
+      <p:sp>
+        <p:nvSpPr>
+          <p:cNvPr id="3" name="Notes Placeholder 2"/>
+          <p:cNvSpPr>
+            <a:spLocks noGrp="1"/>
+          </p:cNvSpPr>
+          <p:nvPr>
+            <p:ph type="body" idx="1"/>
+          </p:nvPr>
+        </p:nvSpPr>
+        <p:spPr/>
+        <p:txBody>
+          <a:bodyPr/>
+          <a:lstStyle/>
+          <a:p>
+            <a:pPr marL="171450" marR="0" lvl="0" indent="-171450" algn="l" defTabSz="914400" rtl="0" eaLnBrk="1" fontAlgn="auto" latinLnBrk="0" hangingPunct="1">
+              <a:lnSpc>
+                <a:spcPct val="100000"/>
+              </a:lnSpc>
+              <a:spcBef>
+                <a:spcPts val="0"/>
+              </a:spcBef>
+              <a:spcAft>
+                <a:spcPts val="0"/>
+              </a:spcAft>
+              <a:buClrTx/>
+              <a:buSzTx/>
+              <a:buFont typeface="Arial" panose="020B0604020202020204" pitchFamily="34" charset="0"/>
+              <a:buChar char="•"/>
+              <a:tabLst/>
+              <a:defRPr/>
+            </a:pPr>
+            <a:r>
+              <a:rPr lang="en-US" dirty="0"/>
+              <a:t>The major benefit of rebasing is that you get a much cleaner project history. First, it eliminates the unnecessary merge commits required by git merge. Second, as you can see in the above diagram, rebasing also results in a perfectly linear project history.</a:t>
+            </a:r>
+          </a:p>
+          <a:p>
+            <a:endParaRPr lang="en-US" dirty="0"/>
+          </a:p>
+        </p:txBody>
+      </p:sp>
+      <p:sp>
+        <p:nvSpPr>
+          <p:cNvPr id="4" name="Slide Number Placeholder 3"/>
+          <p:cNvSpPr>
+            <a:spLocks noGrp="1"/>
+          </p:cNvSpPr>
+          <p:nvPr>
+            <p:ph type="sldNum" sz="quarter" idx="5"/>
+          </p:nvPr>
+        </p:nvSpPr>
+        <p:spPr/>
+        <p:txBody>
+          <a:bodyPr/>
+          <a:lstStyle/>
+          <a:p>
+            <a:fld id="{D06B24EB-7A14-4F78-A6F1-CA4D94E0AE11}" type="slidenum">
+              <a:rPr lang="en-US" smtClean="0"/>
+              <a:t>19</a:t>
+            </a:fld>
+            <a:endParaRPr lang="en-US"/>
+          </a:p>
+        </p:txBody>
+      </p:sp>
+    </p:spTree>
+    <p:extLst>
+      <p:ext uri="{BB962C8B-B14F-4D97-AF65-F5344CB8AC3E}">
+        <p14:creationId xmlns:p14="http://schemas.microsoft.com/office/powerpoint/2010/main" val="3961806104"/>
+      </p:ext>
+    </p:extLst>
+  </p:cSld>
+  <p:clrMapOvr>
+    <a:masterClrMapping/>
+  </p:clrMapOvr>
+</p:notes>
+</file>
+
+<file path=ppt/notesSlides/notesSlide8.xml><?xml version="1.0" encoding="utf-8"?>
+<p:notes xmlns:a="http://schemas.openxmlformats.org/drawingml/2006/main" xmlns:r="http://schemas.openxmlformats.org/officeDocument/2006/relationships" xmlns:p="http://schemas.openxmlformats.org/presentationml/2006/main">
+  <p:cSld>
+    <p:spTree>
+      <p:nvGrpSpPr>
+        <p:cNvPr id="1" name=""/>
+        <p:cNvGrpSpPr/>
+        <p:nvPr/>
+      </p:nvGrpSpPr>
+      <p:grpSpPr>
+        <a:xfrm>
+          <a:off x="0" y="0"/>
+          <a:ext cx="0" cy="0"/>
+          <a:chOff x="0" y="0"/>
+          <a:chExt cx="0" cy="0"/>
+        </a:xfrm>
+      </p:grpSpPr>
+      <p:sp>
+        <p:nvSpPr>
+          <p:cNvPr id="2" name="Slide Image Placeholder 1"/>
+          <p:cNvSpPr>
+            <a:spLocks noGrp="1" noRot="1" noChangeAspect="1"/>
+          </p:cNvSpPr>
+          <p:nvPr>
+            <p:ph type="sldImg"/>
+          </p:nvPr>
+        </p:nvSpPr>
+        <p:spPr/>
+      </p:sp>
+      <p:sp>
+        <p:nvSpPr>
+          <p:cNvPr id="3" name="Notes Placeholder 2"/>
+          <p:cNvSpPr>
+            <a:spLocks noGrp="1"/>
+          </p:cNvSpPr>
+          <p:nvPr>
+            <p:ph type="body" idx="1"/>
+          </p:nvPr>
+        </p:nvSpPr>
+        <p:spPr/>
+        <p:txBody>
+          <a:bodyPr/>
+          <a:lstStyle/>
+          <a:p>
+            <a:pPr marL="0" marR="0" lvl="0" indent="0" algn="l" defTabSz="914400" rtl="0" eaLnBrk="1" fontAlgn="auto" latinLnBrk="0" hangingPunct="1">
+              <a:lnSpc>
+                <a:spcPct val="100000"/>
+              </a:lnSpc>
+              <a:spcBef>
+                <a:spcPts val="0"/>
+              </a:spcBef>
+              <a:spcAft>
+                <a:spcPts val="0"/>
+              </a:spcAft>
+              <a:buClrTx/>
+              <a:buSzTx/>
+              <a:buFontTx/>
+              <a:buNone/>
+              <a:tabLst/>
+              <a:defRPr/>
+            </a:pPr>
+            <a:r>
+              <a:rPr lang="en-US" dirty="0"/>
+              <a:t>Interactive rebasing gives you the opportunity to alter commits as they are moved to the new branch. This is even more powerful than an automated rebase.</a:t>
+            </a:r>
+          </a:p>
+          <a:p>
+            <a:endParaRPr lang="en-US" dirty="0"/>
+          </a:p>
+        </p:txBody>
+      </p:sp>
+      <p:sp>
+        <p:nvSpPr>
+          <p:cNvPr id="4" name="Slide Number Placeholder 3"/>
+          <p:cNvSpPr>
+            <a:spLocks noGrp="1"/>
+          </p:cNvSpPr>
+          <p:nvPr>
+            <p:ph type="sldNum" sz="quarter" idx="5"/>
+          </p:nvPr>
+        </p:nvSpPr>
+        <p:spPr/>
+        <p:txBody>
+          <a:bodyPr/>
+          <a:lstStyle/>
+          <a:p>
+            <a:fld id="{D06B24EB-7A14-4F78-A6F1-CA4D94E0AE11}" type="slidenum">
+              <a:rPr lang="en-US" smtClean="0"/>
+              <a:t>20</a:t>
+            </a:fld>
+            <a:endParaRPr lang="en-US"/>
+          </a:p>
+        </p:txBody>
+      </p:sp>
+    </p:spTree>
+    <p:extLst>
+      <p:ext uri="{BB962C8B-B14F-4D97-AF65-F5344CB8AC3E}">
+        <p14:creationId xmlns:p14="http://schemas.microsoft.com/office/powerpoint/2010/main" val="3024910449"/>
+      </p:ext>
+    </p:extLst>
+  </p:cSld>
+  <p:clrMapOvr>
+    <a:masterClrMapping/>
+  </p:clrMapOvr>
+</p:notes>
+</file>
+
+<file path=ppt/notesSlides/notesSlide9.xml><?xml version="1.0" encoding="utf-8"?>
+<p:notes xmlns:a="http://schemas.openxmlformats.org/drawingml/2006/main" xmlns:r="http://schemas.openxmlformats.org/officeDocument/2006/relationships" xmlns:p="http://schemas.openxmlformats.org/presentationml/2006/main">
+  <p:cSld>
+    <p:spTree>
+      <p:nvGrpSpPr>
+        <p:cNvPr id="1" name=""/>
+        <p:cNvGrpSpPr/>
+        <p:nvPr/>
+      </p:nvGrpSpPr>
+      <p:grpSpPr>
+        <a:xfrm>
+          <a:off x="0" y="0"/>
+          <a:ext cx="0" cy="0"/>
+          <a:chOff x="0" y="0"/>
+          <a:chExt cx="0" cy="0"/>
+        </a:xfrm>
+      </p:grpSpPr>
+      <p:sp>
+        <p:nvSpPr>
+          <p:cNvPr id="2" name="Slide Image Placeholder 1"/>
+          <p:cNvSpPr>
+            <a:spLocks noGrp="1" noRot="1" noChangeAspect="1"/>
+          </p:cNvSpPr>
+          <p:nvPr>
+            <p:ph type="sldImg"/>
+          </p:nvPr>
+        </p:nvSpPr>
+        <p:spPr/>
+      </p:sp>
+      <p:sp>
+        <p:nvSpPr>
+          <p:cNvPr id="3" name="Notes Placeholder 2"/>
+          <p:cNvSpPr>
+            <a:spLocks noGrp="1"/>
+          </p:cNvSpPr>
+          <p:nvPr>
+            <p:ph type="body" idx="1"/>
+          </p:nvPr>
+        </p:nvSpPr>
+        <p:spPr/>
+        <p:txBody>
+          <a:bodyPr/>
+          <a:lstStyle/>
+          <a:p>
+            <a:pPr marL="171450" marR="0" lvl="0" indent="-171450" algn="l" defTabSz="914400" rtl="0" eaLnBrk="1" fontAlgn="auto" latinLnBrk="0" hangingPunct="1">
+              <a:lnSpc>
+                <a:spcPct val="100000"/>
+              </a:lnSpc>
+              <a:spcBef>
+                <a:spcPts val="0"/>
+              </a:spcBef>
+              <a:spcAft>
+                <a:spcPts val="0"/>
+              </a:spcAft>
+              <a:buClrTx/>
+              <a:buSzTx/>
+              <a:buFont typeface="Arial" panose="020B0604020202020204" pitchFamily="34" charset="0"/>
+              <a:buChar char="•"/>
+              <a:tabLst/>
+              <a:defRPr/>
+            </a:pPr>
+            <a:r>
+              <a:rPr lang="en-US" dirty="0"/>
+              <a:t>Once you understand what rebasing is, the most important thing to learn is when not to do it. The golden rule of git rebase is to never use it on public branches.</a:t>
+            </a:r>
+          </a:p>
+          <a:p>
+            <a:pPr marL="171450" indent="-171450">
+              <a:buFont typeface="Arial" panose="020B0604020202020204" pitchFamily="34" charset="0"/>
+              <a:buChar char="•"/>
+            </a:pPr>
+            <a:endParaRPr lang="en-US" dirty="0"/>
+          </a:p>
+        </p:txBody>
+      </p:sp>
+      <p:sp>
+        <p:nvSpPr>
+          <p:cNvPr id="4" name="Slide Number Placeholder 3"/>
+          <p:cNvSpPr>
+            <a:spLocks noGrp="1"/>
+          </p:cNvSpPr>
+          <p:nvPr>
+            <p:ph type="sldNum" sz="quarter" idx="5"/>
+          </p:nvPr>
+        </p:nvSpPr>
+        <p:spPr/>
+        <p:txBody>
+          <a:bodyPr/>
+          <a:lstStyle/>
+          <a:p>
+            <a:fld id="{D06B24EB-7A14-4F78-A6F1-CA4D94E0AE11}" type="slidenum">
+              <a:rPr lang="en-US" smtClean="0"/>
+              <a:t>22</a:t>
+            </a:fld>
+            <a:endParaRPr lang="en-US"/>
+          </a:p>
+        </p:txBody>
+      </p:sp>
+    </p:spTree>
+    <p:extLst>
+      <p:ext uri="{BB962C8B-B14F-4D97-AF65-F5344CB8AC3E}">
+        <p14:creationId xmlns:p14="http://schemas.microsoft.com/office/powerpoint/2010/main" val="2519912103"/>
+      </p:ext>
+    </p:extLst>
+  </p:cSld>
+  <p:clrMapOvr>
+    <a:masterClrMapping/>
+  </p:clrMapOvr>
+</p:notes>
 </file>
 
 <file path=ppt/slideLayouts/slideLayout1.xml><?xml version="1.0" encoding="utf-8"?>
@@ -8425,7 +9859,7 @@
           <p:cNvPr id="2" name="Title 1">
             <a:extLst>
               <a:ext uri="{FF2B5EF4-FFF2-40B4-BE49-F238E27FC236}">
-                <a16:creationId xmlns:a16="http://schemas.microsoft.com/office/drawing/2014/main" id="{E580CE6B-3F64-3594-52F1-371DB981F433}"/>
+                <a16:creationId xmlns:a16="http://schemas.microsoft.com/office/drawing/2014/main" id="{86D6B908-2EB0-65A6-A63F-E796F4359FA6}"/>
               </a:ext>
             </a:extLst>
           </p:cNvPr>
@@ -8436,12 +9870,7 @@
             <p:ph type="title"/>
           </p:nvPr>
         </p:nvSpPr>
-        <p:spPr>
-          <a:xfrm>
-            <a:off x="2592925" y="3429000"/>
-            <a:ext cx="8911687" cy="2592976"/>
-          </a:xfrm>
-        </p:spPr>
+        <p:spPr/>
         <p:txBody>
           <a:bodyPr/>
           <a:lstStyle/>
@@ -8449,7 +9878,41 @@
             <a:pPr algn="ctr"/>
             <a:r>
               <a:rPr lang="en-US" dirty="0"/>
-              <a:t>Any Questions?????</a:t>
+              <a:t>Merging vs. Rebasing</a:t>
+            </a:r>
+          </a:p>
+        </p:txBody>
+      </p:sp>
+      <p:sp>
+        <p:nvSpPr>
+          <p:cNvPr id="3" name="Content Placeholder 2">
+            <a:extLst>
+              <a:ext uri="{FF2B5EF4-FFF2-40B4-BE49-F238E27FC236}">
+                <a16:creationId xmlns:a16="http://schemas.microsoft.com/office/drawing/2014/main" id="{C256308F-A485-339E-6A0D-A501B5D29896}"/>
+              </a:ext>
+            </a:extLst>
+          </p:cNvPr>
+          <p:cNvSpPr>
+            <a:spLocks noGrp="1"/>
+          </p:cNvSpPr>
+          <p:nvPr>
+            <p:ph idx="1"/>
+          </p:nvPr>
+        </p:nvSpPr>
+        <p:spPr/>
+        <p:txBody>
+          <a:bodyPr/>
+          <a:lstStyle/>
+          <a:p>
+            <a:r>
+              <a:rPr lang="en-US" dirty="0"/>
+              <a:t>Solves the same problem</a:t>
+            </a:r>
+          </a:p>
+          <a:p>
+            <a:r>
+              <a:rPr lang="en-US" dirty="0"/>
+              <a:t>Integrate changes from one into another branch.</a:t>
             </a:r>
           </a:p>
         </p:txBody>
@@ -8457,7 +9920,606 @@
     </p:spTree>
     <p:extLst>
       <p:ext uri="{BB962C8B-B14F-4D97-AF65-F5344CB8AC3E}">
-        <p14:creationId xmlns:p14="http://schemas.microsoft.com/office/powerpoint/2010/main" val="911917240"/>
+        <p14:creationId xmlns:p14="http://schemas.microsoft.com/office/powerpoint/2010/main" val="3300127885"/>
+      </p:ext>
+    </p:extLst>
+  </p:cSld>
+  <p:clrMapOvr>
+    <a:masterClrMapping/>
+  </p:clrMapOvr>
+</p:sld>
+</file>
+
+<file path=ppt/slides/slide15.xml><?xml version="1.0" encoding="utf-8"?>
+<p:sld xmlns:a="http://schemas.openxmlformats.org/drawingml/2006/main" xmlns:r="http://schemas.openxmlformats.org/officeDocument/2006/relationships" xmlns:p="http://schemas.openxmlformats.org/presentationml/2006/main">
+  <p:cSld>
+    <p:spTree>
+      <p:nvGrpSpPr>
+        <p:cNvPr id="1" name=""/>
+        <p:cNvGrpSpPr/>
+        <p:nvPr/>
+      </p:nvGrpSpPr>
+      <p:grpSpPr>
+        <a:xfrm>
+          <a:off x="0" y="0"/>
+          <a:ext cx="0" cy="0"/>
+          <a:chOff x="0" y="0"/>
+          <a:chExt cx="0" cy="0"/>
+        </a:xfrm>
+      </p:grpSpPr>
+      <p:sp>
+        <p:nvSpPr>
+          <p:cNvPr id="2" name="Title 1">
+            <a:extLst>
+              <a:ext uri="{FF2B5EF4-FFF2-40B4-BE49-F238E27FC236}">
+                <a16:creationId xmlns:a16="http://schemas.microsoft.com/office/drawing/2014/main" id="{FB5EEB92-B189-C82B-4635-06038D36D7D2}"/>
+              </a:ext>
+            </a:extLst>
+          </p:cNvPr>
+          <p:cNvSpPr>
+            <a:spLocks noGrp="1"/>
+          </p:cNvSpPr>
+          <p:nvPr>
+            <p:ph type="title"/>
+          </p:nvPr>
+        </p:nvSpPr>
+        <p:spPr/>
+        <p:txBody>
+          <a:bodyPr/>
+          <a:lstStyle/>
+          <a:p>
+            <a:r>
+              <a:rPr lang="en-US" dirty="0"/>
+              <a:t>Understanding through an example…</a:t>
+            </a:r>
+          </a:p>
+        </p:txBody>
+      </p:sp>
+      <p:sp>
+        <p:nvSpPr>
+          <p:cNvPr id="3" name="Content Placeholder 2">
+            <a:extLst>
+              <a:ext uri="{FF2B5EF4-FFF2-40B4-BE49-F238E27FC236}">
+                <a16:creationId xmlns:a16="http://schemas.microsoft.com/office/drawing/2014/main" id="{0E7579DE-4AF5-6D95-3890-C3B517A49F7E}"/>
+              </a:ext>
+            </a:extLst>
+          </p:cNvPr>
+          <p:cNvSpPr>
+            <a:spLocks noGrp="1"/>
+          </p:cNvSpPr>
+          <p:nvPr>
+            <p:ph idx="1"/>
+          </p:nvPr>
+        </p:nvSpPr>
+        <p:spPr/>
+        <p:txBody>
+          <a:bodyPr/>
+          <a:lstStyle/>
+          <a:p>
+            <a:r>
+              <a:rPr lang="en-US" dirty="0"/>
+              <a:t>Consider you are working on feature branch. But another teammate updated something on main branch.</a:t>
+            </a:r>
+          </a:p>
+          <a:p>
+            <a:endParaRPr lang="en-US" dirty="0"/>
+          </a:p>
+        </p:txBody>
+      </p:sp>
+      <p:pic>
+        <p:nvPicPr>
+          <p:cNvPr id="5" name="Picture 4">
+            <a:extLst>
+              <a:ext uri="{FF2B5EF4-FFF2-40B4-BE49-F238E27FC236}">
+                <a16:creationId xmlns:a16="http://schemas.microsoft.com/office/drawing/2014/main" id="{21A551FC-4A5C-3420-C2B4-6A8A9AF82D8A}"/>
+              </a:ext>
+            </a:extLst>
+          </p:cNvPr>
+          <p:cNvPicPr>
+            <a:picLocks noChangeAspect="1"/>
+          </p:cNvPicPr>
+          <p:nvPr/>
+        </p:nvPicPr>
+        <p:blipFill>
+          <a:blip r:embed="rId2"/>
+          <a:stretch>
+            <a:fillRect/>
+          </a:stretch>
+        </p:blipFill>
+        <p:spPr>
+          <a:xfrm>
+            <a:off x="3292519" y="3026779"/>
+            <a:ext cx="5267325" cy="2714625"/>
+          </a:xfrm>
+          <a:prstGeom prst="rect">
+            <a:avLst/>
+          </a:prstGeom>
+        </p:spPr>
+      </p:pic>
+    </p:spTree>
+    <p:extLst>
+      <p:ext uri="{BB962C8B-B14F-4D97-AF65-F5344CB8AC3E}">
+        <p14:creationId xmlns:p14="http://schemas.microsoft.com/office/powerpoint/2010/main" val="2583758221"/>
+      </p:ext>
+    </p:extLst>
+  </p:cSld>
+  <p:clrMapOvr>
+    <a:masterClrMapping/>
+  </p:clrMapOvr>
+</p:sld>
+</file>
+
+<file path=ppt/slides/slide16.xml><?xml version="1.0" encoding="utf-8"?>
+<p:sld xmlns:a="http://schemas.openxmlformats.org/drawingml/2006/main" xmlns:r="http://schemas.openxmlformats.org/officeDocument/2006/relationships" xmlns:p="http://schemas.openxmlformats.org/presentationml/2006/main">
+  <p:cSld>
+    <p:spTree>
+      <p:nvGrpSpPr>
+        <p:cNvPr id="1" name=""/>
+        <p:cNvGrpSpPr/>
+        <p:nvPr/>
+      </p:nvGrpSpPr>
+      <p:grpSpPr>
+        <a:xfrm>
+          <a:off x="0" y="0"/>
+          <a:ext cx="0" cy="0"/>
+          <a:chOff x="0" y="0"/>
+          <a:chExt cx="0" cy="0"/>
+        </a:xfrm>
+      </p:grpSpPr>
+      <p:sp>
+        <p:nvSpPr>
+          <p:cNvPr id="2" name="Title 1">
+            <a:extLst>
+              <a:ext uri="{FF2B5EF4-FFF2-40B4-BE49-F238E27FC236}">
+                <a16:creationId xmlns:a16="http://schemas.microsoft.com/office/drawing/2014/main" id="{F0CBB3A5-F7BF-B301-5F77-9BCAC5977CE7}"/>
+              </a:ext>
+            </a:extLst>
+          </p:cNvPr>
+          <p:cNvSpPr>
+            <a:spLocks noGrp="1"/>
+          </p:cNvSpPr>
+          <p:nvPr>
+            <p:ph type="title"/>
+          </p:nvPr>
+        </p:nvSpPr>
+        <p:spPr/>
+        <p:txBody>
+          <a:bodyPr/>
+          <a:lstStyle/>
+          <a:p>
+            <a:r>
+              <a:rPr lang="en-US" dirty="0"/>
+              <a:t>Options you have?</a:t>
+            </a:r>
+          </a:p>
+        </p:txBody>
+      </p:sp>
+      <p:sp>
+        <p:nvSpPr>
+          <p:cNvPr id="3" name="Content Placeholder 2">
+            <a:extLst>
+              <a:ext uri="{FF2B5EF4-FFF2-40B4-BE49-F238E27FC236}">
+                <a16:creationId xmlns:a16="http://schemas.microsoft.com/office/drawing/2014/main" id="{7CDC30AB-446A-F363-C1DE-004720A7ABA8}"/>
+              </a:ext>
+            </a:extLst>
+          </p:cNvPr>
+          <p:cNvSpPr>
+            <a:spLocks noGrp="1"/>
+          </p:cNvSpPr>
+          <p:nvPr>
+            <p:ph idx="1"/>
+          </p:nvPr>
+        </p:nvSpPr>
+        <p:spPr/>
+        <p:txBody>
+          <a:bodyPr/>
+          <a:lstStyle/>
+          <a:p>
+            <a:endParaRPr lang="en-US" dirty="0"/>
+          </a:p>
+          <a:p>
+            <a:endParaRPr lang="en-US" dirty="0"/>
+          </a:p>
+          <a:p>
+            <a:r>
+              <a:rPr lang="en-US" dirty="0"/>
+              <a:t>Merging</a:t>
+            </a:r>
+          </a:p>
+          <a:p>
+            <a:r>
+              <a:rPr lang="en-US" dirty="0"/>
+              <a:t>Rebasing.</a:t>
+            </a:r>
+          </a:p>
+        </p:txBody>
+      </p:sp>
+    </p:spTree>
+    <p:extLst>
+      <p:ext uri="{BB962C8B-B14F-4D97-AF65-F5344CB8AC3E}">
+        <p14:creationId xmlns:p14="http://schemas.microsoft.com/office/powerpoint/2010/main" val="3156929748"/>
+      </p:ext>
+    </p:extLst>
+  </p:cSld>
+  <p:clrMapOvr>
+    <a:masterClrMapping/>
+  </p:clrMapOvr>
+</p:sld>
+</file>
+
+<file path=ppt/slides/slide17.xml><?xml version="1.0" encoding="utf-8"?>
+<p:sld xmlns:a="http://schemas.openxmlformats.org/drawingml/2006/main" xmlns:r="http://schemas.openxmlformats.org/officeDocument/2006/relationships" xmlns:p="http://schemas.openxmlformats.org/presentationml/2006/main">
+  <p:cSld>
+    <p:spTree>
+      <p:nvGrpSpPr>
+        <p:cNvPr id="1" name=""/>
+        <p:cNvGrpSpPr/>
+        <p:nvPr/>
+      </p:nvGrpSpPr>
+      <p:grpSpPr>
+        <a:xfrm>
+          <a:off x="0" y="0"/>
+          <a:ext cx="0" cy="0"/>
+          <a:chOff x="0" y="0"/>
+          <a:chExt cx="0" cy="0"/>
+        </a:xfrm>
+      </p:grpSpPr>
+      <p:sp>
+        <p:nvSpPr>
+          <p:cNvPr id="2" name="Title 1">
+            <a:extLst>
+              <a:ext uri="{FF2B5EF4-FFF2-40B4-BE49-F238E27FC236}">
+                <a16:creationId xmlns:a16="http://schemas.microsoft.com/office/drawing/2014/main" id="{F22AB0D2-C70F-F7ED-AEBE-FEDF24451295}"/>
+              </a:ext>
+            </a:extLst>
+          </p:cNvPr>
+          <p:cNvSpPr>
+            <a:spLocks noGrp="1"/>
+          </p:cNvSpPr>
+          <p:nvPr>
+            <p:ph type="title"/>
+          </p:nvPr>
+        </p:nvSpPr>
+        <p:spPr/>
+        <p:txBody>
+          <a:bodyPr/>
+          <a:lstStyle/>
+          <a:p>
+            <a:r>
+              <a:rPr lang="en-US" dirty="0"/>
+              <a:t>In case of merging…</a:t>
+            </a:r>
+          </a:p>
+        </p:txBody>
+      </p:sp>
+      <p:sp>
+        <p:nvSpPr>
+          <p:cNvPr id="3" name="Content Placeholder 2">
+            <a:extLst>
+              <a:ext uri="{FF2B5EF4-FFF2-40B4-BE49-F238E27FC236}">
+                <a16:creationId xmlns:a16="http://schemas.microsoft.com/office/drawing/2014/main" id="{5F68983F-554F-0ED4-37F2-A4FBE57693B3}"/>
+              </a:ext>
+            </a:extLst>
+          </p:cNvPr>
+          <p:cNvSpPr>
+            <a:spLocks noGrp="1"/>
+          </p:cNvSpPr>
+          <p:nvPr>
+            <p:ph idx="1"/>
+          </p:nvPr>
+        </p:nvSpPr>
+        <p:spPr>
+          <a:xfrm>
+            <a:off x="2589212" y="1515291"/>
+            <a:ext cx="8915400" cy="4395931"/>
+          </a:xfrm>
+        </p:spPr>
+        <p:txBody>
+          <a:bodyPr/>
+          <a:lstStyle/>
+          <a:p>
+            <a:r>
+              <a:rPr lang="en-US" dirty="0"/>
+              <a:t>git checkout feature</a:t>
+            </a:r>
+          </a:p>
+          <a:p>
+            <a:r>
+              <a:rPr lang="en-US" dirty="0"/>
+              <a:t>git merge main</a:t>
+            </a:r>
+          </a:p>
+          <a:p>
+            <a:r>
+              <a:rPr lang="en-US" dirty="0"/>
+              <a:t>This creates a new “merge commit” in the feature.</a:t>
+            </a:r>
+          </a:p>
+          <a:p>
+            <a:r>
+              <a:rPr lang="en-US" dirty="0"/>
+              <a:t>If the main is very active it </a:t>
+            </a:r>
+          </a:p>
+          <a:p>
+            <a:pPr marL="0" indent="0">
+              <a:buNone/>
+            </a:pPr>
+            <a:r>
+              <a:rPr lang="en-US" dirty="0"/>
+              <a:t>will pollute your history.</a:t>
+            </a:r>
+          </a:p>
+        </p:txBody>
+      </p:sp>
+      <p:pic>
+        <p:nvPicPr>
+          <p:cNvPr id="7" name="Picture 6">
+            <a:extLst>
+              <a:ext uri="{FF2B5EF4-FFF2-40B4-BE49-F238E27FC236}">
+                <a16:creationId xmlns:a16="http://schemas.microsoft.com/office/drawing/2014/main" id="{9C8F1906-95A2-8C88-1CFF-0D213FC90CC4}"/>
+              </a:ext>
+            </a:extLst>
+          </p:cNvPr>
+          <p:cNvPicPr>
+            <a:picLocks noChangeAspect="1"/>
+          </p:cNvPicPr>
+          <p:nvPr/>
+        </p:nvPicPr>
+        <p:blipFill>
+          <a:blip r:embed="rId2"/>
+          <a:stretch>
+            <a:fillRect/>
+          </a:stretch>
+        </p:blipFill>
+        <p:spPr>
+          <a:xfrm>
+            <a:off x="6065837" y="2796181"/>
+            <a:ext cx="5438775" cy="3286125"/>
+          </a:xfrm>
+          <a:prstGeom prst="rect">
+            <a:avLst/>
+          </a:prstGeom>
+        </p:spPr>
+      </p:pic>
+    </p:spTree>
+    <p:extLst>
+      <p:ext uri="{BB962C8B-B14F-4D97-AF65-F5344CB8AC3E}">
+        <p14:creationId xmlns:p14="http://schemas.microsoft.com/office/powerpoint/2010/main" val="39583139"/>
+      </p:ext>
+    </p:extLst>
+  </p:cSld>
+  <p:clrMapOvr>
+    <a:masterClrMapping/>
+  </p:clrMapOvr>
+</p:sld>
+</file>
+
+<file path=ppt/slides/slide18.xml><?xml version="1.0" encoding="utf-8"?>
+<p:sld xmlns:a="http://schemas.openxmlformats.org/drawingml/2006/main" xmlns:r="http://schemas.openxmlformats.org/officeDocument/2006/relationships" xmlns:p="http://schemas.openxmlformats.org/presentationml/2006/main">
+  <p:cSld>
+    <p:spTree>
+      <p:nvGrpSpPr>
+        <p:cNvPr id="1" name=""/>
+        <p:cNvGrpSpPr/>
+        <p:nvPr/>
+      </p:nvGrpSpPr>
+      <p:grpSpPr>
+        <a:xfrm>
+          <a:off x="0" y="0"/>
+          <a:ext cx="0" cy="0"/>
+          <a:chOff x="0" y="0"/>
+          <a:chExt cx="0" cy="0"/>
+        </a:xfrm>
+      </p:grpSpPr>
+      <p:sp>
+        <p:nvSpPr>
+          <p:cNvPr id="2" name="Title 1">
+            <a:extLst>
+              <a:ext uri="{FF2B5EF4-FFF2-40B4-BE49-F238E27FC236}">
+                <a16:creationId xmlns:a16="http://schemas.microsoft.com/office/drawing/2014/main" id="{6FCD32EC-DA86-4790-3A15-5563D4C5B7F6}"/>
+              </a:ext>
+            </a:extLst>
+          </p:cNvPr>
+          <p:cNvSpPr>
+            <a:spLocks noGrp="1"/>
+          </p:cNvSpPr>
+          <p:nvPr>
+            <p:ph type="title"/>
+          </p:nvPr>
+        </p:nvSpPr>
+        <p:spPr/>
+        <p:txBody>
+          <a:bodyPr/>
+          <a:lstStyle/>
+          <a:p>
+            <a:r>
+              <a:rPr lang="en-US" dirty="0"/>
+              <a:t>If you go for the Rebase Option…</a:t>
+            </a:r>
+          </a:p>
+        </p:txBody>
+      </p:sp>
+      <p:sp>
+        <p:nvSpPr>
+          <p:cNvPr id="3" name="Content Placeholder 2">
+            <a:extLst>
+              <a:ext uri="{FF2B5EF4-FFF2-40B4-BE49-F238E27FC236}">
+                <a16:creationId xmlns:a16="http://schemas.microsoft.com/office/drawing/2014/main" id="{ACA1B418-BF13-5904-D32C-764EF230D61C}"/>
+              </a:ext>
+            </a:extLst>
+          </p:cNvPr>
+          <p:cNvSpPr>
+            <a:spLocks noGrp="1"/>
+          </p:cNvSpPr>
+          <p:nvPr>
+            <p:ph idx="1"/>
+          </p:nvPr>
+        </p:nvSpPr>
+        <p:spPr>
+          <a:xfrm>
+            <a:off x="2589212" y="2133599"/>
+            <a:ext cx="8915400" cy="4397829"/>
+          </a:xfrm>
+        </p:spPr>
+        <p:txBody>
+          <a:bodyPr>
+            <a:normAutofit/>
+          </a:bodyPr>
+          <a:lstStyle/>
+          <a:p>
+            <a:r>
+              <a:rPr lang="en-US" dirty="0"/>
+              <a:t>git checkout feature</a:t>
+            </a:r>
+          </a:p>
+          <a:p>
+            <a:r>
+              <a:rPr lang="en-US" dirty="0"/>
+              <a:t>git rebase main</a:t>
+            </a:r>
+          </a:p>
+          <a:p>
+            <a:pPr marL="0" indent="0">
+              <a:buNone/>
+            </a:pPr>
+            <a:endParaRPr lang="en-US" dirty="0"/>
+          </a:p>
+        </p:txBody>
+      </p:sp>
+      <p:pic>
+        <p:nvPicPr>
+          <p:cNvPr id="5" name="Picture 4">
+            <a:extLst>
+              <a:ext uri="{FF2B5EF4-FFF2-40B4-BE49-F238E27FC236}">
+                <a16:creationId xmlns:a16="http://schemas.microsoft.com/office/drawing/2014/main" id="{F2E471BE-93E9-13E1-5892-1FBCA126511C}"/>
+              </a:ext>
+            </a:extLst>
+          </p:cNvPr>
+          <p:cNvPicPr>
+            <a:picLocks noChangeAspect="1"/>
+          </p:cNvPicPr>
+          <p:nvPr/>
+        </p:nvPicPr>
+        <p:blipFill>
+          <a:blip r:embed="rId3"/>
+          <a:stretch>
+            <a:fillRect/>
+          </a:stretch>
+        </p:blipFill>
+        <p:spPr>
+          <a:xfrm>
+            <a:off x="6537960" y="2133600"/>
+            <a:ext cx="5334000" cy="3171825"/>
+          </a:xfrm>
+          <a:prstGeom prst="rect">
+            <a:avLst/>
+          </a:prstGeom>
+        </p:spPr>
+      </p:pic>
+    </p:spTree>
+    <p:extLst>
+      <p:ext uri="{BB962C8B-B14F-4D97-AF65-F5344CB8AC3E}">
+        <p14:creationId xmlns:p14="http://schemas.microsoft.com/office/powerpoint/2010/main" val="3311979327"/>
+      </p:ext>
+    </p:extLst>
+  </p:cSld>
+  <p:clrMapOvr>
+    <a:masterClrMapping/>
+  </p:clrMapOvr>
+</p:sld>
+</file>
+
+<file path=ppt/slides/slide19.xml><?xml version="1.0" encoding="utf-8"?>
+<p:sld xmlns:a="http://schemas.openxmlformats.org/drawingml/2006/main" xmlns:r="http://schemas.openxmlformats.org/officeDocument/2006/relationships" xmlns:p="http://schemas.openxmlformats.org/presentationml/2006/main">
+  <p:cSld>
+    <p:spTree>
+      <p:nvGrpSpPr>
+        <p:cNvPr id="1" name=""/>
+        <p:cNvGrpSpPr/>
+        <p:nvPr/>
+      </p:nvGrpSpPr>
+      <p:grpSpPr>
+        <a:xfrm>
+          <a:off x="0" y="0"/>
+          <a:ext cx="0" cy="0"/>
+          <a:chOff x="0" y="0"/>
+          <a:chExt cx="0" cy="0"/>
+        </a:xfrm>
+      </p:grpSpPr>
+      <p:sp>
+        <p:nvSpPr>
+          <p:cNvPr id="2" name="Title 1">
+            <a:extLst>
+              <a:ext uri="{FF2B5EF4-FFF2-40B4-BE49-F238E27FC236}">
+                <a16:creationId xmlns:a16="http://schemas.microsoft.com/office/drawing/2014/main" id="{E3BC1759-B991-16C7-2A31-1BED424435E0}"/>
+              </a:ext>
+            </a:extLst>
+          </p:cNvPr>
+          <p:cNvSpPr>
+            <a:spLocks noGrp="1"/>
+          </p:cNvSpPr>
+          <p:nvPr>
+            <p:ph type="title"/>
+          </p:nvPr>
+        </p:nvSpPr>
+        <p:spPr/>
+        <p:txBody>
+          <a:bodyPr/>
+          <a:lstStyle/>
+          <a:p>
+            <a:pPr algn="ctr"/>
+            <a:r>
+              <a:rPr lang="en-US" dirty="0"/>
+              <a:t>Benefit of rebasing…</a:t>
+            </a:r>
+          </a:p>
+        </p:txBody>
+      </p:sp>
+      <p:sp>
+        <p:nvSpPr>
+          <p:cNvPr id="3" name="Content Placeholder 2">
+            <a:extLst>
+              <a:ext uri="{FF2B5EF4-FFF2-40B4-BE49-F238E27FC236}">
+                <a16:creationId xmlns:a16="http://schemas.microsoft.com/office/drawing/2014/main" id="{D24DF558-B6D8-BCAE-D9B8-C28F1C7A952D}"/>
+              </a:ext>
+            </a:extLst>
+          </p:cNvPr>
+          <p:cNvSpPr>
+            <a:spLocks noGrp="1"/>
+          </p:cNvSpPr>
+          <p:nvPr>
+            <p:ph idx="1"/>
+          </p:nvPr>
+        </p:nvSpPr>
+        <p:spPr/>
+        <p:txBody>
+          <a:bodyPr/>
+          <a:lstStyle/>
+          <a:p>
+            <a:r>
+              <a:rPr lang="en-US" dirty="0"/>
+              <a:t>Cleaner project history</a:t>
+            </a:r>
+          </a:p>
+          <a:p>
+            <a:r>
+              <a:rPr lang="en-US" dirty="0"/>
+              <a:t>unnecessary merge commits</a:t>
+            </a:r>
+          </a:p>
+          <a:p>
+            <a:r>
+              <a:rPr lang="en-US" dirty="0"/>
+              <a:t>perfectly linear project history. </a:t>
+            </a:r>
+          </a:p>
+        </p:txBody>
+      </p:sp>
+    </p:spTree>
+    <p:extLst>
+      <p:ext uri="{BB962C8B-B14F-4D97-AF65-F5344CB8AC3E}">
+        <p14:creationId xmlns:p14="http://schemas.microsoft.com/office/powerpoint/2010/main" val="103999386"/>
       </p:ext>
     </p:extLst>
   </p:cSld>
@@ -8541,10 +10603,19 @@
                 <a:effectLst/>
                 <a:latin typeface="-apple-system"/>
               </a:rPr>
-              <a:t>Version control, also known as source control, is the practice of tracking and managing changes to software code. </a:t>
-            </a:r>
-          </a:p>
-          <a:p>
+              <a:t>also known as source control.</a:t>
+            </a:r>
+          </a:p>
+          <a:p>
+            <a:r>
+              <a:rPr lang="en-US" dirty="0">
+                <a:solidFill>
+                  <a:srgbClr val="4D4D4D"/>
+                </a:solidFill>
+                <a:latin typeface="-apple-system"/>
+              </a:rPr>
+              <a:t>T</a:t>
+            </a:r>
             <a:r>
               <a:rPr lang="en-US" b="0" i="0" dirty="0">
                 <a:solidFill>
@@ -8553,7 +10624,7 @@
                 <a:effectLst/>
                 <a:latin typeface="-apple-system"/>
               </a:rPr>
-              <a:t>It is a software tools that help software teams manage changes to source code over time.</a:t>
+              <a:t>racking and managing changes.</a:t>
             </a:r>
             <a:endParaRPr lang="en-US" dirty="0"/>
           </a:p>
@@ -8563,6 +10634,517 @@
     <p:extLst>
       <p:ext uri="{BB962C8B-B14F-4D97-AF65-F5344CB8AC3E}">
         <p14:creationId xmlns:p14="http://schemas.microsoft.com/office/powerpoint/2010/main" val="3298509873"/>
+      </p:ext>
+    </p:extLst>
+  </p:cSld>
+  <p:clrMapOvr>
+    <a:masterClrMapping/>
+  </p:clrMapOvr>
+</p:sld>
+</file>
+
+<file path=ppt/slides/slide20.xml><?xml version="1.0" encoding="utf-8"?>
+<p:sld xmlns:a="http://schemas.openxmlformats.org/drawingml/2006/main" xmlns:r="http://schemas.openxmlformats.org/officeDocument/2006/relationships" xmlns:p="http://schemas.openxmlformats.org/presentationml/2006/main">
+  <p:cSld>
+    <p:spTree>
+      <p:nvGrpSpPr>
+        <p:cNvPr id="1" name=""/>
+        <p:cNvGrpSpPr/>
+        <p:nvPr/>
+      </p:nvGrpSpPr>
+      <p:grpSpPr>
+        <a:xfrm>
+          <a:off x="0" y="0"/>
+          <a:ext cx="0" cy="0"/>
+          <a:chOff x="0" y="0"/>
+          <a:chExt cx="0" cy="0"/>
+        </a:xfrm>
+      </p:grpSpPr>
+      <p:sp>
+        <p:nvSpPr>
+          <p:cNvPr id="2" name="Title 1">
+            <a:extLst>
+              <a:ext uri="{FF2B5EF4-FFF2-40B4-BE49-F238E27FC236}">
+                <a16:creationId xmlns:a16="http://schemas.microsoft.com/office/drawing/2014/main" id="{5FF725AD-A140-4A2D-6FFF-3571E1BAE2D4}"/>
+              </a:ext>
+            </a:extLst>
+          </p:cNvPr>
+          <p:cNvSpPr>
+            <a:spLocks noGrp="1"/>
+          </p:cNvSpPr>
+          <p:nvPr>
+            <p:ph type="title"/>
+          </p:nvPr>
+        </p:nvSpPr>
+        <p:spPr/>
+        <p:txBody>
+          <a:bodyPr/>
+          <a:lstStyle/>
+          <a:p>
+            <a:r>
+              <a:rPr lang="en-US" dirty="0"/>
+              <a:t>Interactive Rebasing…</a:t>
+            </a:r>
+          </a:p>
+        </p:txBody>
+      </p:sp>
+      <p:sp>
+        <p:nvSpPr>
+          <p:cNvPr id="3" name="Content Placeholder 2">
+            <a:extLst>
+              <a:ext uri="{FF2B5EF4-FFF2-40B4-BE49-F238E27FC236}">
+                <a16:creationId xmlns:a16="http://schemas.microsoft.com/office/drawing/2014/main" id="{60245049-8727-3171-0972-76456C3AC10A}"/>
+              </a:ext>
+            </a:extLst>
+          </p:cNvPr>
+          <p:cNvSpPr>
+            <a:spLocks noGrp="1"/>
+          </p:cNvSpPr>
+          <p:nvPr>
+            <p:ph idx="1"/>
+          </p:nvPr>
+        </p:nvSpPr>
+        <p:spPr/>
+        <p:txBody>
+          <a:bodyPr/>
+          <a:lstStyle/>
+          <a:p>
+            <a:r>
+              <a:rPr lang="en-US" dirty="0"/>
+              <a:t>Alter commits</a:t>
+            </a:r>
+          </a:p>
+          <a:p>
+            <a:r>
+              <a:rPr lang="en-US" dirty="0"/>
+              <a:t>powerful than an automated rebase</a:t>
+            </a:r>
+          </a:p>
+          <a:p>
+            <a:r>
+              <a:rPr lang="en-US" dirty="0"/>
+              <a:t>git checkout feature</a:t>
+            </a:r>
+          </a:p>
+          <a:p>
+            <a:r>
+              <a:rPr lang="en-US" dirty="0"/>
+              <a:t>git rebase -</a:t>
+            </a:r>
+            <a:r>
+              <a:rPr lang="en-US" dirty="0" err="1"/>
+              <a:t>i</a:t>
+            </a:r>
+            <a:r>
+              <a:rPr lang="en-US" dirty="0"/>
+              <a:t> main</a:t>
+            </a:r>
+          </a:p>
+          <a:p>
+            <a:r>
+              <a:rPr lang="en-US" b="0" i="0" dirty="0">
+                <a:solidFill>
+                  <a:srgbClr val="4D4D4D"/>
+                </a:solidFill>
+                <a:effectLst/>
+                <a:latin typeface="-apple-system"/>
+              </a:rPr>
+              <a:t>This will open a text editor listing all of the commits that are about to be moved.</a:t>
+            </a:r>
+          </a:p>
+          <a:p>
+            <a:endParaRPr lang="en-US" dirty="0"/>
+          </a:p>
+        </p:txBody>
+      </p:sp>
+      <p:pic>
+        <p:nvPicPr>
+          <p:cNvPr id="5" name="Picture 4">
+            <a:extLst>
+              <a:ext uri="{FF2B5EF4-FFF2-40B4-BE49-F238E27FC236}">
+                <a16:creationId xmlns:a16="http://schemas.microsoft.com/office/drawing/2014/main" id="{BB085F7C-4333-5AEC-471B-432BA0B46420}"/>
+              </a:ext>
+            </a:extLst>
+          </p:cNvPr>
+          <p:cNvPicPr>
+            <a:picLocks noChangeAspect="1"/>
+          </p:cNvPicPr>
+          <p:nvPr/>
+        </p:nvPicPr>
+        <p:blipFill>
+          <a:blip r:embed="rId3"/>
+          <a:stretch>
+            <a:fillRect/>
+          </a:stretch>
+        </p:blipFill>
+        <p:spPr>
+          <a:xfrm>
+            <a:off x="2986495" y="4397964"/>
+            <a:ext cx="4991100" cy="962025"/>
+          </a:xfrm>
+          <a:prstGeom prst="rect">
+            <a:avLst/>
+          </a:prstGeom>
+        </p:spPr>
+      </p:pic>
+    </p:spTree>
+    <p:extLst>
+      <p:ext uri="{BB962C8B-B14F-4D97-AF65-F5344CB8AC3E}">
+        <p14:creationId xmlns:p14="http://schemas.microsoft.com/office/powerpoint/2010/main" val="1437101753"/>
+      </p:ext>
+    </p:extLst>
+  </p:cSld>
+  <p:clrMapOvr>
+    <a:masterClrMapping/>
+  </p:clrMapOvr>
+</p:sld>
+</file>
+
+<file path=ppt/slides/slide21.xml><?xml version="1.0" encoding="utf-8"?>
+<p:sld xmlns:a="http://schemas.openxmlformats.org/drawingml/2006/main" xmlns:r="http://schemas.openxmlformats.org/officeDocument/2006/relationships" xmlns:p="http://schemas.openxmlformats.org/presentationml/2006/main">
+  <p:cSld>
+    <p:spTree>
+      <p:nvGrpSpPr>
+        <p:cNvPr id="1" name=""/>
+        <p:cNvGrpSpPr/>
+        <p:nvPr/>
+      </p:nvGrpSpPr>
+      <p:grpSpPr>
+        <a:xfrm>
+          <a:off x="0" y="0"/>
+          <a:ext cx="0" cy="0"/>
+          <a:chOff x="0" y="0"/>
+          <a:chExt cx="0" cy="0"/>
+        </a:xfrm>
+      </p:grpSpPr>
+      <p:sp>
+        <p:nvSpPr>
+          <p:cNvPr id="2" name="Title 1">
+            <a:extLst>
+              <a:ext uri="{FF2B5EF4-FFF2-40B4-BE49-F238E27FC236}">
+                <a16:creationId xmlns:a16="http://schemas.microsoft.com/office/drawing/2014/main" id="{3F96BC08-FBE7-6E60-F14D-F3B8DAFA6A2A}"/>
+              </a:ext>
+            </a:extLst>
+          </p:cNvPr>
+          <p:cNvSpPr>
+            <a:spLocks noGrp="1"/>
+          </p:cNvSpPr>
+          <p:nvPr>
+            <p:ph type="title"/>
+          </p:nvPr>
+        </p:nvSpPr>
+        <p:spPr/>
+        <p:txBody>
+          <a:bodyPr/>
+          <a:lstStyle/>
+          <a:p>
+            <a:r>
+              <a:rPr lang="en-US" dirty="0"/>
+              <a:t>Interactive Rebasing…</a:t>
+            </a:r>
+          </a:p>
+        </p:txBody>
+      </p:sp>
+      <p:sp>
+        <p:nvSpPr>
+          <p:cNvPr id="3" name="Content Placeholder 2">
+            <a:extLst>
+              <a:ext uri="{FF2B5EF4-FFF2-40B4-BE49-F238E27FC236}">
+                <a16:creationId xmlns:a16="http://schemas.microsoft.com/office/drawing/2014/main" id="{D445855E-9775-633B-26E0-CFFD3C2AEBE9}"/>
+              </a:ext>
+            </a:extLst>
+          </p:cNvPr>
+          <p:cNvSpPr>
+            <a:spLocks noGrp="1"/>
+          </p:cNvSpPr>
+          <p:nvPr>
+            <p:ph idx="1"/>
+          </p:nvPr>
+        </p:nvSpPr>
+        <p:spPr/>
+        <p:txBody>
+          <a:bodyPr/>
+          <a:lstStyle/>
+          <a:p>
+            <a:r>
+              <a:rPr lang="en-US" dirty="0"/>
+              <a:t>If the 2nd commit fixes a small problem in the 1st commit, you can condense them into a single commit with the fixup command.</a:t>
+            </a:r>
+          </a:p>
+          <a:p>
+            <a:endParaRPr lang="en-US" dirty="0"/>
+          </a:p>
+          <a:p>
+            <a:endParaRPr lang="en-US" dirty="0"/>
+          </a:p>
+          <a:p>
+            <a:endParaRPr lang="en-US" dirty="0"/>
+          </a:p>
+          <a:p>
+            <a:r>
+              <a:rPr lang="en-US" dirty="0"/>
+              <a:t>Result </a:t>
+            </a:r>
+            <a:r>
+              <a:rPr lang="en-US" dirty="0">
+                <a:sym typeface="Wingdings" panose="05000000000000000000" pitchFamily="2" charset="2"/>
+              </a:rPr>
+              <a:t></a:t>
+            </a:r>
+            <a:endParaRPr lang="en-US" dirty="0"/>
+          </a:p>
+          <a:p>
+            <a:endParaRPr lang="en-US" dirty="0"/>
+          </a:p>
+          <a:p>
+            <a:endParaRPr lang="en-US" dirty="0"/>
+          </a:p>
+          <a:p>
+            <a:endParaRPr lang="en-US" dirty="0"/>
+          </a:p>
+        </p:txBody>
+      </p:sp>
+      <p:pic>
+        <p:nvPicPr>
+          <p:cNvPr id="5" name="Picture 4">
+            <a:extLst>
+              <a:ext uri="{FF2B5EF4-FFF2-40B4-BE49-F238E27FC236}">
+                <a16:creationId xmlns:a16="http://schemas.microsoft.com/office/drawing/2014/main" id="{14973E16-10FC-42A5-60CE-207DC5EA6B1D}"/>
+              </a:ext>
+            </a:extLst>
+          </p:cNvPr>
+          <p:cNvPicPr>
+            <a:picLocks noChangeAspect="1"/>
+          </p:cNvPicPr>
+          <p:nvPr/>
+        </p:nvPicPr>
+        <p:blipFill>
+          <a:blip r:embed="rId2"/>
+          <a:stretch>
+            <a:fillRect/>
+          </a:stretch>
+        </p:blipFill>
+        <p:spPr>
+          <a:xfrm>
+            <a:off x="3053035" y="2971800"/>
+            <a:ext cx="4962525" cy="914400"/>
+          </a:xfrm>
+          <a:prstGeom prst="rect">
+            <a:avLst/>
+          </a:prstGeom>
+        </p:spPr>
+      </p:pic>
+      <p:pic>
+        <p:nvPicPr>
+          <p:cNvPr id="7" name="Picture 6">
+            <a:extLst>
+              <a:ext uri="{FF2B5EF4-FFF2-40B4-BE49-F238E27FC236}">
+                <a16:creationId xmlns:a16="http://schemas.microsoft.com/office/drawing/2014/main" id="{8744F1AD-5FBA-24EE-7ACC-C5A8A837EE38}"/>
+              </a:ext>
+            </a:extLst>
+          </p:cNvPr>
+          <p:cNvPicPr>
+            <a:picLocks noChangeAspect="1"/>
+          </p:cNvPicPr>
+          <p:nvPr/>
+        </p:nvPicPr>
+        <p:blipFill>
+          <a:blip r:embed="rId3"/>
+          <a:stretch>
+            <a:fillRect/>
+          </a:stretch>
+        </p:blipFill>
+        <p:spPr>
+          <a:xfrm>
+            <a:off x="6791824" y="2733682"/>
+            <a:ext cx="5048250" cy="3086100"/>
+          </a:xfrm>
+          <a:prstGeom prst="rect">
+            <a:avLst/>
+          </a:prstGeom>
+        </p:spPr>
+      </p:pic>
+    </p:spTree>
+    <p:extLst>
+      <p:ext uri="{BB962C8B-B14F-4D97-AF65-F5344CB8AC3E}">
+        <p14:creationId xmlns:p14="http://schemas.microsoft.com/office/powerpoint/2010/main" val="375130715"/>
+      </p:ext>
+    </p:extLst>
+  </p:cSld>
+  <p:clrMapOvr>
+    <a:masterClrMapping/>
+  </p:clrMapOvr>
+</p:sld>
+</file>
+
+<file path=ppt/slides/slide22.xml><?xml version="1.0" encoding="utf-8"?>
+<p:sld xmlns:a="http://schemas.openxmlformats.org/drawingml/2006/main" xmlns:r="http://schemas.openxmlformats.org/officeDocument/2006/relationships" xmlns:p="http://schemas.openxmlformats.org/presentationml/2006/main">
+  <p:cSld>
+    <p:spTree>
+      <p:nvGrpSpPr>
+        <p:cNvPr id="1" name=""/>
+        <p:cNvGrpSpPr/>
+        <p:nvPr/>
+      </p:nvGrpSpPr>
+      <p:grpSpPr>
+        <a:xfrm>
+          <a:off x="0" y="0"/>
+          <a:ext cx="0" cy="0"/>
+          <a:chOff x="0" y="0"/>
+          <a:chExt cx="0" cy="0"/>
+        </a:xfrm>
+      </p:grpSpPr>
+      <p:sp>
+        <p:nvSpPr>
+          <p:cNvPr id="2" name="Title 1">
+            <a:extLst>
+              <a:ext uri="{FF2B5EF4-FFF2-40B4-BE49-F238E27FC236}">
+                <a16:creationId xmlns:a16="http://schemas.microsoft.com/office/drawing/2014/main" id="{0CC673CB-1BE6-0221-31D2-79BAA7C039E7}"/>
+              </a:ext>
+            </a:extLst>
+          </p:cNvPr>
+          <p:cNvSpPr>
+            <a:spLocks noGrp="1"/>
+          </p:cNvSpPr>
+          <p:nvPr>
+            <p:ph type="title"/>
+          </p:nvPr>
+        </p:nvSpPr>
+        <p:spPr/>
+        <p:txBody>
+          <a:bodyPr/>
+          <a:lstStyle/>
+          <a:p>
+            <a:r>
+              <a:rPr lang="en-US" dirty="0"/>
+              <a:t>The Golden Rule of Rebasing…</a:t>
+            </a:r>
+          </a:p>
+        </p:txBody>
+      </p:sp>
+      <p:sp>
+        <p:nvSpPr>
+          <p:cNvPr id="3" name="Content Placeholder 2">
+            <a:extLst>
+              <a:ext uri="{FF2B5EF4-FFF2-40B4-BE49-F238E27FC236}">
+                <a16:creationId xmlns:a16="http://schemas.microsoft.com/office/drawing/2014/main" id="{E4E9F2D1-55E6-8A97-1965-3C0EEEB00767}"/>
+              </a:ext>
+            </a:extLst>
+          </p:cNvPr>
+          <p:cNvSpPr>
+            <a:spLocks noGrp="1"/>
+          </p:cNvSpPr>
+          <p:nvPr>
+            <p:ph idx="1"/>
+          </p:nvPr>
+        </p:nvSpPr>
+        <p:spPr/>
+        <p:txBody>
+          <a:bodyPr/>
+          <a:lstStyle/>
+          <a:p>
+            <a:endParaRPr lang="en-US" dirty="0"/>
+          </a:p>
+        </p:txBody>
+      </p:sp>
+      <p:pic>
+        <p:nvPicPr>
+          <p:cNvPr id="5" name="Picture 4">
+            <a:extLst>
+              <a:ext uri="{FF2B5EF4-FFF2-40B4-BE49-F238E27FC236}">
+                <a16:creationId xmlns:a16="http://schemas.microsoft.com/office/drawing/2014/main" id="{64CCC8F6-F398-1219-CC5E-80055E2F7429}"/>
+              </a:ext>
+            </a:extLst>
+          </p:cNvPr>
+          <p:cNvPicPr>
+            <a:picLocks noChangeAspect="1"/>
+          </p:cNvPicPr>
+          <p:nvPr/>
+        </p:nvPicPr>
+        <p:blipFill>
+          <a:blip r:embed="rId3"/>
+          <a:stretch>
+            <a:fillRect/>
+          </a:stretch>
+        </p:blipFill>
+        <p:spPr>
+          <a:xfrm>
+            <a:off x="2704011" y="3029501"/>
+            <a:ext cx="8800601" cy="3038475"/>
+          </a:xfrm>
+          <a:prstGeom prst="rect">
+            <a:avLst/>
+          </a:prstGeom>
+        </p:spPr>
+      </p:pic>
+    </p:spTree>
+    <p:extLst>
+      <p:ext uri="{BB962C8B-B14F-4D97-AF65-F5344CB8AC3E}">
+        <p14:creationId xmlns:p14="http://schemas.microsoft.com/office/powerpoint/2010/main" val="1112779374"/>
+      </p:ext>
+    </p:extLst>
+  </p:cSld>
+  <p:clrMapOvr>
+    <a:masterClrMapping/>
+  </p:clrMapOvr>
+</p:sld>
+</file>
+
+<file path=ppt/slides/slide23.xml><?xml version="1.0" encoding="utf-8"?>
+<p:sld xmlns:a="http://schemas.openxmlformats.org/drawingml/2006/main" xmlns:r="http://schemas.openxmlformats.org/officeDocument/2006/relationships" xmlns:p="http://schemas.openxmlformats.org/presentationml/2006/main">
+  <p:cSld>
+    <p:spTree>
+      <p:nvGrpSpPr>
+        <p:cNvPr id="1" name=""/>
+        <p:cNvGrpSpPr/>
+        <p:nvPr/>
+      </p:nvGrpSpPr>
+      <p:grpSpPr>
+        <a:xfrm>
+          <a:off x="0" y="0"/>
+          <a:ext cx="0" cy="0"/>
+          <a:chOff x="0" y="0"/>
+          <a:chExt cx="0" cy="0"/>
+        </a:xfrm>
+      </p:grpSpPr>
+      <p:sp>
+        <p:nvSpPr>
+          <p:cNvPr id="2" name="Title 1">
+            <a:extLst>
+              <a:ext uri="{FF2B5EF4-FFF2-40B4-BE49-F238E27FC236}">
+                <a16:creationId xmlns:a16="http://schemas.microsoft.com/office/drawing/2014/main" id="{E580CE6B-3F64-3594-52F1-371DB981F433}"/>
+              </a:ext>
+            </a:extLst>
+          </p:cNvPr>
+          <p:cNvSpPr>
+            <a:spLocks noGrp="1"/>
+          </p:cNvSpPr>
+          <p:nvPr>
+            <p:ph type="title"/>
+          </p:nvPr>
+        </p:nvSpPr>
+        <p:spPr>
+          <a:xfrm>
+            <a:off x="2592925" y="3429000"/>
+            <a:ext cx="8911687" cy="2592976"/>
+          </a:xfrm>
+        </p:spPr>
+        <p:txBody>
+          <a:bodyPr/>
+          <a:lstStyle/>
+          <a:p>
+            <a:pPr algn="ctr"/>
+            <a:r>
+              <a:rPr lang="en-US" dirty="0"/>
+              <a:t>Any Questions?????</a:t>
+            </a:r>
+          </a:p>
+        </p:txBody>
+      </p:sp>
+    </p:spTree>
+    <p:extLst>
+      <p:ext uri="{BB962C8B-B14F-4D97-AF65-F5344CB8AC3E}">
+        <p14:creationId xmlns:p14="http://schemas.microsoft.com/office/powerpoint/2010/main" val="911917240"/>
       </p:ext>
     </p:extLst>
   </p:cSld>
@@ -8769,16 +11351,6 @@
               </a:rPr>
               <a:t>creates a new Git repository</a:t>
             </a:r>
-            <a:r>
-              <a:rPr lang="en-US" b="0" i="0" dirty="0">
-                <a:solidFill>
-                  <a:srgbClr val="202124"/>
-                </a:solidFill>
-                <a:effectLst/>
-                <a:latin typeface="arial" panose="020B0604020202020204" pitchFamily="34" charset="0"/>
-              </a:rPr>
-              <a:t>. It can be used to convert an existing, unversioned project to a Git repository or initialize a new, empty repository.</a:t>
-            </a:r>
           </a:p>
           <a:p>
             <a:r>
@@ -9137,15 +11709,13 @@
           <a:p>
             <a:r>
               <a:rPr lang="en-US" dirty="0"/>
-              <a:t>You can use git log “SHA” to see the commits after that specific SHA only</a:t>
-            </a:r>
-            <a:r>
-              <a:rPr lang="en-US"/>
-              <a:t>. git </a:t>
-            </a:r>
+              <a:t> use git log “SHA”  </a:t>
+            </a:r>
+          </a:p>
+          <a:p>
             <a:r>
               <a:rPr lang="en-US" dirty="0"/>
-              <a:t>show “SHA” as well to see the info regarding that particular commit.</a:t>
+              <a:t>git show “SHA”</a:t>
             </a:r>
           </a:p>
         </p:txBody>
@@ -9234,39 +11804,20 @@
           <a:p>
             <a:r>
               <a:rPr lang="en-US" b="1" dirty="0"/>
-              <a:t>Add : </a:t>
-            </a:r>
-            <a:r>
-              <a:rPr lang="en-US" dirty="0"/>
-              <a:t>using git add you can add the modified files into the staged files.</a:t>
-            </a:r>
+              <a:t>Add :</a:t>
+            </a:r>
+            <a:endParaRPr lang="en-US" dirty="0"/>
           </a:p>
           <a:p>
             <a:r>
               <a:rPr lang="en-US" b="1" dirty="0"/>
               <a:t>Commit : </a:t>
             </a:r>
-            <a:r>
-              <a:rPr lang="en-US" dirty="0"/>
-              <a:t>After staging the files you can commit them using </a:t>
-            </a:r>
+          </a:p>
+          <a:p>
             <a:r>
               <a:rPr lang="en-US" b="1" dirty="0"/>
-              <a:t>git commit –m “appropriate message foe that commit” .</a:t>
-            </a:r>
-          </a:p>
-          <a:p>
-            <a:r>
-              <a:rPr lang="en-US" b="1" dirty="0"/>
-              <a:t>diff : </a:t>
-            </a:r>
-            <a:r>
-              <a:rPr lang="en-US" dirty="0"/>
-              <a:t>you can use git diff command to see those changes who have not been committed yet.</a:t>
-            </a:r>
-            <a:r>
-              <a:rPr lang="en-US" b="1" dirty="0"/>
-              <a:t> </a:t>
+              <a:t>diff :</a:t>
             </a:r>
           </a:p>
           <a:p>
@@ -9276,15 +11827,7 @@
             </a:r>
             <a:r>
               <a:rPr lang="en-US" dirty="0"/>
-              <a:t>you can add tags to some extent of your project in-order to capture the specific point in history that is further used to point to a released version.</a:t>
-            </a:r>
-            <a:r>
-              <a:rPr lang="en-US" b="1" dirty="0"/>
-              <a:t> </a:t>
-            </a:r>
-            <a:r>
-              <a:rPr lang="en-US" dirty="0"/>
-              <a:t>Using git tag v1.0</a:t>
+              <a:t>git tag v1.0</a:t>
             </a:r>
           </a:p>
         </p:txBody>
@@ -9686,4 +12229,299 @@
     </a:ext>
   </a:extLst>
 </a:theme>
+</file>
+
+<file path=ppt/theme/theme2.xml><?xml version="1.0" encoding="utf-8"?>
+<a:theme xmlns:a="http://schemas.openxmlformats.org/drawingml/2006/main" name="Office Theme">
+  <a:themeElements>
+    <a:clrScheme name="Office">
+      <a:dk1>
+        <a:sysClr val="windowText" lastClr="000000"/>
+      </a:dk1>
+      <a:lt1>
+        <a:sysClr val="window" lastClr="FFFFFF"/>
+      </a:lt1>
+      <a:dk2>
+        <a:srgbClr val="44546A"/>
+      </a:dk2>
+      <a:lt2>
+        <a:srgbClr val="E7E6E6"/>
+      </a:lt2>
+      <a:accent1>
+        <a:srgbClr val="4472C4"/>
+      </a:accent1>
+      <a:accent2>
+        <a:srgbClr val="ED7D31"/>
+      </a:accent2>
+      <a:accent3>
+        <a:srgbClr val="A5A5A5"/>
+      </a:accent3>
+      <a:accent4>
+        <a:srgbClr val="FFC000"/>
+      </a:accent4>
+      <a:accent5>
+        <a:srgbClr val="5B9BD5"/>
+      </a:accent5>
+      <a:accent6>
+        <a:srgbClr val="70AD47"/>
+      </a:accent6>
+      <a:hlink>
+        <a:srgbClr val="0563C1"/>
+      </a:hlink>
+      <a:folHlink>
+        <a:srgbClr val="954F72"/>
+      </a:folHlink>
+    </a:clrScheme>
+    <a:fontScheme name="Office">
+      <a:majorFont>
+        <a:latin typeface="Calibri Light" panose="020F0302020204030204"/>
+        <a:ea typeface=""/>
+        <a:cs typeface=""/>
+        <a:font script="Jpan" typeface="游ゴシック Light"/>
+        <a:font script="Hang" typeface="맑은 고딕"/>
+        <a:font script="Hans" typeface="等线 Light"/>
+        <a:font script="Hant" typeface="新細明體"/>
+        <a:font script="Arab" typeface="Times New Roman"/>
+        <a:font script="Hebr" typeface="Times New Roman"/>
+        <a:font script="Thai" typeface="Angsana New"/>
+        <a:font script="Ethi" typeface="Nyala"/>
+        <a:font script="Beng" typeface="Vrinda"/>
+        <a:font script="Gujr" typeface="Shruti"/>
+        <a:font script="Khmr" typeface="MoolBoran"/>
+        <a:font script="Knda" typeface="Tunga"/>
+        <a:font script="Guru" typeface="Raavi"/>
+        <a:font script="Cans" typeface="Euphemia"/>
+        <a:font script="Cher" typeface="Plantagenet Cherokee"/>
+        <a:font script="Yiii" typeface="Microsoft Yi Baiti"/>
+        <a:font script="Tibt" typeface="Microsoft Himalaya"/>
+        <a:font script="Thaa" typeface="MV Boli"/>
+        <a:font script="Deva" typeface="Mangal"/>
+        <a:font script="Telu" typeface="Gautami"/>
+        <a:font script="Taml" typeface="Latha"/>
+        <a:font script="Syrc" typeface="Estrangelo Edessa"/>
+        <a:font script="Orya" typeface="Kalinga"/>
+        <a:font script="Mlym" typeface="Kartika"/>
+        <a:font script="Laoo" typeface="DokChampa"/>
+        <a:font script="Sinh" typeface="Iskoola Pota"/>
+        <a:font script="Mong" typeface="Mongolian Baiti"/>
+        <a:font script="Viet" typeface="Times New Roman"/>
+        <a:font script="Uigh" typeface="Microsoft Uighur"/>
+        <a:font script="Geor" typeface="Sylfaen"/>
+        <a:font script="Armn" typeface="Arial"/>
+        <a:font script="Bugi" typeface="Leelawadee UI"/>
+        <a:font script="Bopo" typeface="Microsoft JhengHei"/>
+        <a:font script="Java" typeface="Javanese Text"/>
+        <a:font script="Lisu" typeface="Segoe UI"/>
+        <a:font script="Mymr" typeface="Myanmar Text"/>
+        <a:font script="Nkoo" typeface="Ebrima"/>
+        <a:font script="Olck" typeface="Nirmala UI"/>
+        <a:font script="Osma" typeface="Ebrima"/>
+        <a:font script="Phag" typeface="Phagspa"/>
+        <a:font script="Syrn" typeface="Estrangelo Edessa"/>
+        <a:font script="Syrj" typeface="Estrangelo Edessa"/>
+        <a:font script="Syre" typeface="Estrangelo Edessa"/>
+        <a:font script="Sora" typeface="Nirmala UI"/>
+        <a:font script="Tale" typeface="Microsoft Tai Le"/>
+        <a:font script="Talu" typeface="Microsoft New Tai Lue"/>
+        <a:font script="Tfng" typeface="Ebrima"/>
+      </a:majorFont>
+      <a:minorFont>
+        <a:latin typeface="Calibri" panose="020F0502020204030204"/>
+        <a:ea typeface=""/>
+        <a:cs typeface=""/>
+        <a:font script="Jpan" typeface="游ゴシック"/>
+        <a:font script="Hang" typeface="맑은 고딕"/>
+        <a:font script="Hans" typeface="等线"/>
+        <a:font script="Hant" typeface="新細明體"/>
+        <a:font script="Arab" typeface="Arial"/>
+        <a:font script="Hebr" typeface="Arial"/>
+        <a:font script="Thai" typeface="Cordia New"/>
+        <a:font script="Ethi" typeface="Nyala"/>
+        <a:font script="Beng" typeface="Vrinda"/>
+        <a:font script="Gujr" typeface="Shruti"/>
+        <a:font script="Khmr" typeface="DaunPenh"/>
+        <a:font script="Knda" typeface="Tunga"/>
+        <a:font script="Guru" typeface="Raavi"/>
+        <a:font script="Cans" typeface="Euphemia"/>
+        <a:font script="Cher" typeface="Plantagenet Cherokee"/>
+        <a:font script="Yiii" typeface="Microsoft Yi Baiti"/>
+        <a:font script="Tibt" typeface="Microsoft Himalaya"/>
+        <a:font script="Thaa" typeface="MV Boli"/>
+        <a:font script="Deva" typeface="Mangal"/>
+        <a:font script="Telu" typeface="Gautami"/>
+        <a:font script="Taml" typeface="Latha"/>
+        <a:font script="Syrc" typeface="Estrangelo Edessa"/>
+        <a:font script="Orya" typeface="Kalinga"/>
+        <a:font script="Mlym" typeface="Kartika"/>
+        <a:font script="Laoo" typeface="DokChampa"/>
+        <a:font script="Sinh" typeface="Iskoola Pota"/>
+        <a:font script="Mong" typeface="Mongolian Baiti"/>
+        <a:font script="Viet" typeface="Arial"/>
+        <a:font script="Uigh" typeface="Microsoft Uighur"/>
+        <a:font script="Geor" typeface="Sylfaen"/>
+        <a:font script="Armn" typeface="Arial"/>
+        <a:font script="Bugi" typeface="Leelawadee UI"/>
+        <a:font script="Bopo" typeface="Microsoft JhengHei"/>
+        <a:font script="Java" typeface="Javanese Text"/>
+        <a:font script="Lisu" typeface="Segoe UI"/>
+        <a:font script="Mymr" typeface="Myanmar Text"/>
+        <a:font script="Nkoo" typeface="Ebrima"/>
+        <a:font script="Olck" typeface="Nirmala UI"/>
+        <a:font script="Osma" typeface="Ebrima"/>
+        <a:font script="Phag" typeface="Phagspa"/>
+        <a:font script="Syrn" typeface="Estrangelo Edessa"/>
+        <a:font script="Syrj" typeface="Estrangelo Edessa"/>
+        <a:font script="Syre" typeface="Estrangelo Edessa"/>
+        <a:font script="Sora" typeface="Nirmala UI"/>
+        <a:font script="Tale" typeface="Microsoft Tai Le"/>
+        <a:font script="Talu" typeface="Microsoft New Tai Lue"/>
+        <a:font script="Tfng" typeface="Ebrima"/>
+      </a:minorFont>
+    </a:fontScheme>
+    <a:fmtScheme name="Office">
+      <a:fillStyleLst>
+        <a:solidFill>
+          <a:schemeClr val="phClr"/>
+        </a:solidFill>
+        <a:gradFill rotWithShape="1">
+          <a:gsLst>
+            <a:gs pos="0">
+              <a:schemeClr val="phClr">
+                <a:lumMod val="110000"/>
+                <a:satMod val="105000"/>
+                <a:tint val="67000"/>
+              </a:schemeClr>
+            </a:gs>
+            <a:gs pos="50000">
+              <a:schemeClr val="phClr">
+                <a:lumMod val="105000"/>
+                <a:satMod val="103000"/>
+                <a:tint val="73000"/>
+              </a:schemeClr>
+            </a:gs>
+            <a:gs pos="100000">
+              <a:schemeClr val="phClr">
+                <a:lumMod val="105000"/>
+                <a:satMod val="109000"/>
+                <a:tint val="81000"/>
+              </a:schemeClr>
+            </a:gs>
+          </a:gsLst>
+          <a:lin ang="5400000" scaled="0"/>
+        </a:gradFill>
+        <a:gradFill rotWithShape="1">
+          <a:gsLst>
+            <a:gs pos="0">
+              <a:schemeClr val="phClr">
+                <a:satMod val="103000"/>
+                <a:lumMod val="102000"/>
+                <a:tint val="94000"/>
+              </a:schemeClr>
+            </a:gs>
+            <a:gs pos="50000">
+              <a:schemeClr val="phClr">
+                <a:satMod val="110000"/>
+                <a:lumMod val="100000"/>
+                <a:shade val="100000"/>
+              </a:schemeClr>
+            </a:gs>
+            <a:gs pos="100000">
+              <a:schemeClr val="phClr">
+                <a:lumMod val="99000"/>
+                <a:satMod val="120000"/>
+                <a:shade val="78000"/>
+              </a:schemeClr>
+            </a:gs>
+          </a:gsLst>
+          <a:lin ang="5400000" scaled="0"/>
+        </a:gradFill>
+      </a:fillStyleLst>
+      <a:lnStyleLst>
+        <a:ln w="6350" cap="flat" cmpd="sng" algn="ctr">
+          <a:solidFill>
+            <a:schemeClr val="phClr"/>
+          </a:solidFill>
+          <a:prstDash val="solid"/>
+          <a:miter lim="800000"/>
+        </a:ln>
+        <a:ln w="12700" cap="flat" cmpd="sng" algn="ctr">
+          <a:solidFill>
+            <a:schemeClr val="phClr"/>
+          </a:solidFill>
+          <a:prstDash val="solid"/>
+          <a:miter lim="800000"/>
+        </a:ln>
+        <a:ln w="19050" cap="flat" cmpd="sng" algn="ctr">
+          <a:solidFill>
+            <a:schemeClr val="phClr"/>
+          </a:solidFill>
+          <a:prstDash val="solid"/>
+          <a:miter lim="800000"/>
+        </a:ln>
+      </a:lnStyleLst>
+      <a:effectStyleLst>
+        <a:effectStyle>
+          <a:effectLst/>
+        </a:effectStyle>
+        <a:effectStyle>
+          <a:effectLst/>
+        </a:effectStyle>
+        <a:effectStyle>
+          <a:effectLst>
+            <a:outerShdw blurRad="57150" dist="19050" dir="5400000" algn="ctr" rotWithShape="0">
+              <a:srgbClr val="000000">
+                <a:alpha val="63000"/>
+              </a:srgbClr>
+            </a:outerShdw>
+          </a:effectLst>
+        </a:effectStyle>
+      </a:effectStyleLst>
+      <a:bgFillStyleLst>
+        <a:solidFill>
+          <a:schemeClr val="phClr"/>
+        </a:solidFill>
+        <a:solidFill>
+          <a:schemeClr val="phClr">
+            <a:tint val="95000"/>
+            <a:satMod val="170000"/>
+          </a:schemeClr>
+        </a:solidFill>
+        <a:gradFill rotWithShape="1">
+          <a:gsLst>
+            <a:gs pos="0">
+              <a:schemeClr val="phClr">
+                <a:tint val="93000"/>
+                <a:satMod val="150000"/>
+                <a:shade val="98000"/>
+                <a:lumMod val="102000"/>
+              </a:schemeClr>
+            </a:gs>
+            <a:gs pos="50000">
+              <a:schemeClr val="phClr">
+                <a:tint val="98000"/>
+                <a:satMod val="130000"/>
+                <a:shade val="90000"/>
+                <a:lumMod val="103000"/>
+              </a:schemeClr>
+            </a:gs>
+            <a:gs pos="100000">
+              <a:schemeClr val="phClr">
+                <a:shade val="63000"/>
+                <a:satMod val="120000"/>
+              </a:schemeClr>
+            </a:gs>
+          </a:gsLst>
+          <a:lin ang="5400000" scaled="0"/>
+        </a:gradFill>
+      </a:bgFillStyleLst>
+    </a:fmtScheme>
+  </a:themeElements>
+  <a:objectDefaults/>
+  <a:extraClrSchemeLst/>
+  <a:extLst>
+    <a:ext uri="{05A4C25C-085E-4340-85A3-A5531E510DB2}">
+      <thm15:themeFamily xmlns:thm15="http://schemas.microsoft.com/office/thememl/2012/main" name="Office Theme" id="{62F939B6-93AF-4DB8-9C6B-D6C7DFDC589F}" vid="{4A3C46E8-61CC-4603-A589-7422A47A8E4A}"/>
+    </a:ext>
+  </a:extLst>
+</a:theme>
 </file>
</xml_diff>